<commit_message>
Update Vehicle Loan Default Prediction.pptx
</commit_message>
<xml_diff>
--- a/Pravin Kumar/Vehicle Loan Default Prediction.pptx
+++ b/Pravin Kumar/Vehicle Loan Default Prediction.pptx
@@ -3791,7 +3791,7 @@
                   <a:srgbClr val="FF0000"/>
                 </a:solidFill>
               </a:rPr>
-              <a:t>Viswanath Kannan</a:t>
+              <a:t>Vishwanath Kannan</a:t>
             </a:r>
           </a:p>
           <a:p>
@@ -4160,7 +4160,7 @@
                   <a:srgbClr val="0055A0"/>
                 </a:solidFill>
               </a:rPr>
-              <a:t>Define the technology and business problem you have solved</a:t>
+              <a:t>The objective of this project is to predict whether it will be Payment default in the ﬁrst EMI on Vehicle Loan on due date or not using the Loan Default Prediction Dataset from Kaggle.</a:t>
             </a:r>
           </a:p>
           <a:p>
@@ -4169,12 +4169,12 @@
               <a:buChar char="Ø"/>
             </a:pPr>
             <a:r>
-              <a:rPr lang="en-IN" sz="2400" dirty="0">
+              <a:rPr lang="en-US" sz="2400" dirty="0">
                 <a:solidFill>
                   <a:srgbClr val="0055A0"/>
                 </a:solidFill>
               </a:rPr>
-              <a:t>Why it is important problem</a:t>
+              <a:t>Finding out the critical features that to help him/the company to evaluating the probability of default of the customer</a:t>
             </a:r>
           </a:p>
           <a:p>
@@ -4182,28 +4182,22 @@
               <a:buFont typeface="Wingdings" panose="05000000000000000000" pitchFamily="2" charset="2"/>
               <a:buChar char="Ø"/>
             </a:pPr>
-            <a:r>
-              <a:rPr lang="en-IN" sz="2400" dirty="0">
-                <a:solidFill>
-                  <a:srgbClr val="0055A0"/>
-                </a:solidFill>
-              </a:rPr>
-              <a:t>What are the value additions you planned</a:t>
-            </a:r>
+            <a:endParaRPr lang="en-IN" sz="2400" dirty="0">
+              <a:solidFill>
+                <a:srgbClr val="0055A0"/>
+              </a:solidFill>
+            </a:endParaRPr>
           </a:p>
           <a:p>
             <a:pPr marL="342900" indent="-342900" algn="l">
               <a:buFont typeface="Wingdings" panose="05000000000000000000" pitchFamily="2" charset="2"/>
               <a:buChar char="Ø"/>
             </a:pPr>
-            <a:r>
-              <a:rPr lang="en-IN" sz="2400" dirty="0">
-                <a:solidFill>
-                  <a:srgbClr val="0055A0"/>
-                </a:solidFill>
-              </a:rPr>
-              <a:t>Tentative time: 7 minutes</a:t>
-            </a:r>
+            <a:endParaRPr lang="en-IN" sz="2400" dirty="0">
+              <a:solidFill>
+                <a:srgbClr val="0055A0"/>
+              </a:solidFill>
+            </a:endParaRPr>
           </a:p>
         </p:txBody>
       </p:sp>
@@ -4335,104 +4329,6 @@
                                           <p:spTgt spid="30">
                                             <p:txEl>
                                               <p:pRg st="1" end="1"/>
-                                            </p:txEl>
-                                          </p:spTgt>
-                                        </p:tgtEl>
-                                        <p:attrNameLst>
-                                          <p:attrName>style.visibility</p:attrName>
-                                        </p:attrNameLst>
-                                      </p:cBhvr>
-                                      <p:to>
-                                        <p:strVal val="visible"/>
-                                      </p:to>
-                                    </p:set>
-                                  </p:childTnLst>
-                                </p:cTn>
-                              </p:par>
-                            </p:childTnLst>
-                          </p:cTn>
-                        </p:par>
-                      </p:childTnLst>
-                    </p:cTn>
-                  </p:par>
-                  <p:par>
-                    <p:cTn id="11" fill="hold">
-                      <p:stCondLst>
-                        <p:cond delay="indefinite"/>
-                      </p:stCondLst>
-                      <p:childTnLst>
-                        <p:par>
-                          <p:cTn id="12" fill="hold">
-                            <p:stCondLst>
-                              <p:cond delay="0"/>
-                            </p:stCondLst>
-                            <p:childTnLst>
-                              <p:par>
-                                <p:cTn id="13" presetID="1" presetClass="entr" presetSubtype="0" fill="hold" nodeType="clickEffect">
-                                  <p:stCondLst>
-                                    <p:cond delay="0"/>
-                                  </p:stCondLst>
-                                  <p:childTnLst>
-                                    <p:set>
-                                      <p:cBhvr>
-                                        <p:cTn id="14" dur="1" fill="hold">
-                                          <p:stCondLst>
-                                            <p:cond delay="0"/>
-                                          </p:stCondLst>
-                                        </p:cTn>
-                                        <p:tgtEl>
-                                          <p:spTgt spid="30">
-                                            <p:txEl>
-                                              <p:pRg st="2" end="2"/>
-                                            </p:txEl>
-                                          </p:spTgt>
-                                        </p:tgtEl>
-                                        <p:attrNameLst>
-                                          <p:attrName>style.visibility</p:attrName>
-                                        </p:attrNameLst>
-                                      </p:cBhvr>
-                                      <p:to>
-                                        <p:strVal val="visible"/>
-                                      </p:to>
-                                    </p:set>
-                                  </p:childTnLst>
-                                </p:cTn>
-                              </p:par>
-                            </p:childTnLst>
-                          </p:cTn>
-                        </p:par>
-                      </p:childTnLst>
-                    </p:cTn>
-                  </p:par>
-                  <p:par>
-                    <p:cTn id="15" fill="hold">
-                      <p:stCondLst>
-                        <p:cond delay="indefinite"/>
-                      </p:stCondLst>
-                      <p:childTnLst>
-                        <p:par>
-                          <p:cTn id="16" fill="hold">
-                            <p:stCondLst>
-                              <p:cond delay="0"/>
-                            </p:stCondLst>
-                            <p:childTnLst>
-                              <p:par>
-                                <p:cTn id="17" presetID="1" presetClass="entr" presetSubtype="0" fill="hold" nodeType="clickEffect">
-                                  <p:stCondLst>
-                                    <p:cond delay="0"/>
-                                  </p:stCondLst>
-                                  <p:childTnLst>
-                                    <p:set>
-                                      <p:cBhvr>
-                                        <p:cTn id="18" dur="1" fill="hold">
-                                          <p:stCondLst>
-                                            <p:cond delay="0"/>
-                                          </p:stCondLst>
-                                        </p:cTn>
-                                        <p:tgtEl>
-                                          <p:spTgt spid="30">
-                                            <p:txEl>
-                                              <p:pRg st="3" end="3"/>
                                             </p:txEl>
                                           </p:spTgt>
                                         </p:tgtEl>

</xml_diff>

<commit_message>
Updated the problem statement
</commit_message>
<xml_diff>
--- a/Pravin Kumar/Vehicle Loan Default Prediction.pptx
+++ b/Pravin Kumar/Vehicle Loan Default Prediction.pptx
@@ -4577,7 +4577,7 @@
                   <a:srgbClr val="0055A0"/>
                 </a:solidFill>
               </a:rPr>
-              <a:t>The objective of this project is to predict whether it will be Payment default in the ﬁrst EMI on Vehicle Loan on due date or not using the Loan Default Prediction Dataset from Kaggle.</a:t>
+              <a:t>The objective of this project is to predict whether the customer will default their ﬁrst EMI on the Vehicle Loan on due date or not using the Loan Default Prediction Dataset from Kaggle.</a:t>
             </a:r>
           </a:p>
           <a:p>
@@ -4591,7 +4591,7 @@
                   <a:srgbClr val="0055A0"/>
                 </a:solidFill>
               </a:rPr>
-              <a:t>Finding out the critical features that to help him/the company to evaluating the probability of default of the customer</a:t>
+              <a:t>Finding out the critical features that to help him/the company to evaluating the probability of default of the customer, as well as prevent loosing out potential customers otherwise lost.</a:t>
             </a:r>
           </a:p>
           <a:p>

</xml_diff>

<commit_message>
Updates to ppt and feature selection
</commit_message>
<xml_diff>
--- a/Pravin Kumar/Vehicle Loan Default Prediction.pptx
+++ b/Pravin Kumar/Vehicle Loan Default Prediction.pptx
@@ -5,7 +5,7 @@
     <p:sldMasterId id="2147483648" r:id="rId1"/>
   </p:sldMasterIdLst>
   <p:notesMasterIdLst>
-    <p:notesMasterId r:id="rId13"/>
+    <p:notesMasterId r:id="rId12"/>
   </p:notesMasterIdLst>
   <p:sldIdLst>
     <p:sldId id="328" r:id="rId2"/>
@@ -14,11 +14,10 @@
     <p:sldId id="330" r:id="rId5"/>
     <p:sldId id="333" r:id="rId6"/>
     <p:sldId id="331" r:id="rId7"/>
-    <p:sldId id="334" r:id="rId8"/>
-    <p:sldId id="335" r:id="rId9"/>
-    <p:sldId id="337" r:id="rId10"/>
-    <p:sldId id="336" r:id="rId11"/>
-    <p:sldId id="263" r:id="rId12"/>
+    <p:sldId id="335" r:id="rId8"/>
+    <p:sldId id="337" r:id="rId9"/>
+    <p:sldId id="336" r:id="rId10"/>
+    <p:sldId id="263" r:id="rId11"/>
   </p:sldIdLst>
   <p:sldSz cx="9144000" cy="6858000" type="screen4x3"/>
   <p:notesSz cx="6858000" cy="9144000"/>
@@ -3883,86 +3882,6 @@
 </file>
 
 <file path=ppt/slides/slide10.xml><?xml version="1.0" encoding="utf-8"?>
-<p:sld xmlns:a="http://schemas.openxmlformats.org/drawingml/2006/main" xmlns:r="http://schemas.openxmlformats.org/officeDocument/2006/relationships" xmlns:p="http://schemas.openxmlformats.org/presentationml/2006/main">
-  <p:cSld>
-    <p:spTree>
-      <p:nvGrpSpPr>
-        <p:cNvPr id="1" name=""/>
-        <p:cNvGrpSpPr/>
-        <p:nvPr/>
-      </p:nvGrpSpPr>
-      <p:grpSpPr>
-        <a:xfrm>
-          <a:off x="0" y="0"/>
-          <a:ext cx="0" cy="0"/>
-          <a:chOff x="0" y="0"/>
-          <a:chExt cx="0" cy="0"/>
-        </a:xfrm>
-      </p:grpSpPr>
-      <p:sp>
-        <p:nvSpPr>
-          <p:cNvPr id="2" name="Title 1">
-            <a:extLst>
-              <a:ext uri="{FF2B5EF4-FFF2-40B4-BE49-F238E27FC236}">
-                <a16:creationId xmlns:a16="http://schemas.microsoft.com/office/drawing/2014/main" id="{F6584AFD-6D6B-41BD-8AA7-E55CA8893D30}"/>
-              </a:ext>
-            </a:extLst>
-          </p:cNvPr>
-          <p:cNvSpPr>
-            <a:spLocks noGrp="1"/>
-          </p:cNvSpPr>
-          <p:nvPr>
-            <p:ph type="title"/>
-          </p:nvPr>
-        </p:nvSpPr>
-        <p:spPr/>
-        <p:txBody>
-          <a:bodyPr/>
-          <a:lstStyle/>
-          <a:p>
-            <a:endParaRPr lang="en-US"/>
-          </a:p>
-        </p:txBody>
-      </p:sp>
-      <p:sp>
-        <p:nvSpPr>
-          <p:cNvPr id="3" name="Content Placeholder 2">
-            <a:extLst>
-              <a:ext uri="{FF2B5EF4-FFF2-40B4-BE49-F238E27FC236}">
-                <a16:creationId xmlns:a16="http://schemas.microsoft.com/office/drawing/2014/main" id="{1DD175B5-E4E4-4BD1-8A11-20DED898F8EA}"/>
-              </a:ext>
-            </a:extLst>
-          </p:cNvPr>
-          <p:cNvSpPr>
-            <a:spLocks noGrp="1"/>
-          </p:cNvSpPr>
-          <p:nvPr>
-            <p:ph idx="1"/>
-          </p:nvPr>
-        </p:nvSpPr>
-        <p:spPr/>
-        <p:txBody>
-          <a:bodyPr/>
-          <a:lstStyle/>
-          <a:p>
-            <a:endParaRPr lang="en-US"/>
-          </a:p>
-        </p:txBody>
-      </p:sp>
-    </p:spTree>
-    <p:extLst>
-      <p:ext uri="{BB962C8B-B14F-4D97-AF65-F5344CB8AC3E}">
-        <p14:creationId xmlns:p14="http://schemas.microsoft.com/office/powerpoint/2010/main" val="1235205643"/>
-      </p:ext>
-    </p:extLst>
-  </p:cSld>
-  <p:clrMapOvr>
-    <a:masterClrMapping/>
-  </p:clrMapOvr>
-</p:sld>
-</file>
-
-<file path=ppt/slides/slide11.xml><?xml version="1.0" encoding="utf-8"?>
 <p:sld xmlns:a="http://schemas.openxmlformats.org/drawingml/2006/main" xmlns:r="http://schemas.openxmlformats.org/officeDocument/2006/relationships" xmlns:p="http://schemas.openxmlformats.org/presentationml/2006/main">
   <p:cSld>
     <p:spTree>
@@ -5921,130 +5840,11 @@
               <a:buFont typeface="Wingdings" panose="05000000000000000000" pitchFamily="2" charset="2"/>
               <a:buChar char="Ø"/>
             </a:pPr>
-            <a:r>
-              <a:rPr lang="en-IN" sz="2400" dirty="0">
-                <a:solidFill>
-                  <a:srgbClr val="0055A0"/>
-                </a:solidFill>
-              </a:rPr>
-              <a:t>Algorithms considered with pros and cons</a:t>
-            </a:r>
-          </a:p>
-          <a:p>
-            <a:pPr marL="342900" indent="-342900" algn="l">
-              <a:buFont typeface="Wingdings" panose="05000000000000000000" pitchFamily="2" charset="2"/>
-              <a:buChar char="Ø"/>
-            </a:pPr>
-            <a:r>
-              <a:rPr lang="en-IN" sz="2400" dirty="0">
-                <a:solidFill>
-                  <a:srgbClr val="0055A0"/>
-                </a:solidFill>
-              </a:rPr>
-              <a:t>Solution architecture (technical and functional)</a:t>
-            </a:r>
-          </a:p>
-          <a:p>
-            <a:pPr marL="342900" indent="-342900" algn="l">
-              <a:buFont typeface="Wingdings" panose="05000000000000000000" pitchFamily="2" charset="2"/>
-              <a:buChar char="Ø"/>
-            </a:pPr>
-            <a:r>
-              <a:rPr lang="en-IN" sz="2400" dirty="0">
-                <a:solidFill>
-                  <a:srgbClr val="0055A0"/>
-                </a:solidFill>
-              </a:rPr>
-              <a:t>Results</a:t>
-            </a:r>
-          </a:p>
-          <a:p>
-            <a:pPr marL="342900" indent="-342900" algn="l">
-              <a:buFont typeface="Wingdings" panose="05000000000000000000" pitchFamily="2" charset="2"/>
-              <a:buChar char="Ø"/>
-            </a:pPr>
-            <a:r>
-              <a:rPr lang="en-IN" sz="2400" dirty="0">
-                <a:solidFill>
-                  <a:srgbClr val="0055A0"/>
-                </a:solidFill>
-              </a:rPr>
-              <a:t>How to take to production</a:t>
-            </a:r>
-          </a:p>
-          <a:p>
-            <a:pPr marL="342900" indent="-342900" algn="l">
-              <a:buFont typeface="Wingdings" panose="05000000000000000000" pitchFamily="2" charset="2"/>
-              <a:buChar char="Ø"/>
-            </a:pPr>
-            <a:r>
-              <a:rPr lang="en-IN" sz="2400" dirty="0">
-                <a:solidFill>
-                  <a:srgbClr val="0055A0"/>
-                </a:solidFill>
-              </a:rPr>
-              <a:t>Any follow-up protentional capstone project problems</a:t>
-            </a:r>
-          </a:p>
-          <a:p>
-            <a:pPr marL="342900" indent="-342900" algn="l">
-              <a:buFont typeface="Wingdings" panose="05000000000000000000" pitchFamily="2" charset="2"/>
-              <a:buChar char="Ø"/>
-            </a:pPr>
-            <a:r>
-              <a:rPr lang="en-IN" sz="2400" dirty="0">
-                <a:solidFill>
-                  <a:srgbClr val="0055A0"/>
-                </a:solidFill>
-              </a:rPr>
-              <a:t>Conclusions</a:t>
-            </a:r>
-          </a:p>
-          <a:p>
-            <a:pPr marL="342900" indent="-342900" algn="l">
-              <a:buFont typeface="Wingdings" panose="05000000000000000000" pitchFamily="2" charset="2"/>
-              <a:buChar char="Ø"/>
-            </a:pPr>
-            <a:r>
-              <a:rPr lang="en-IN" sz="2400" dirty="0">
-                <a:solidFill>
-                  <a:srgbClr val="0055A0"/>
-                </a:solidFill>
-              </a:rPr>
-              <a:t>Tentative time: 6 to 10 minutes</a:t>
-            </a:r>
-          </a:p>
-        </p:txBody>
-      </p:sp>
-      <p:sp>
-        <p:nvSpPr>
-          <p:cNvPr id="6" name="TextBox 5"/>
-          <p:cNvSpPr txBox="1"/>
-          <p:nvPr/>
-        </p:nvSpPr>
-        <p:spPr>
-          <a:xfrm>
-            <a:off x="454231" y="54114"/>
-            <a:ext cx="8537369" cy="707886"/>
-          </a:xfrm>
-          <a:prstGeom prst="rect">
-            <a:avLst/>
-          </a:prstGeom>
-          <a:noFill/>
-        </p:spPr>
-        <p:txBody>
-          <a:bodyPr wrap="square" rtlCol="0">
-            <a:spAutoFit/>
-          </a:bodyPr>
-          <a:lstStyle/>
-          <a:p>
-            <a:r>
-              <a:rPr lang="en-US" sz="4000">
-                <a:ea typeface="굴림" panose="020B0600000101010101" pitchFamily="34" charset="-127"/>
-              </a:rPr>
-              <a:t>Algorithms, Solution and Conclusions</a:t>
-            </a:r>
-            <a:endParaRPr lang="en-US" sz="4000" b="1" dirty="0"/>
+            <a:endParaRPr lang="en-IN" sz="2400" dirty="0">
+              <a:solidFill>
+                <a:srgbClr val="0055A0"/>
+              </a:solidFill>
+            </a:endParaRPr>
           </a:p>
         </p:txBody>
       </p:sp>
@@ -6079,10 +5879,15 @@
                             </p:stCondLst>
                             <p:childTnLst>
                               <p:par>
-                                <p:cTn id="5" presetID="1" presetClass="entr" presetSubtype="0" fill="hold" nodeType="clickEffect">
+                                <p:cTn id="5" presetID="1" presetClass="entr" presetSubtype="0" fill="hold" nodeType="clickEffect" nodePh="1">
                                   <p:stCondLst>
                                     <p:cond delay="0"/>
                                   </p:stCondLst>
+                                  <p:endCondLst>
+                                    <p:cond evt="begin" delay="0">
+                                      <p:tn val="5"/>
+                                    </p:cond>
+                                  </p:endCondLst>
                                   <p:childTnLst>
                                     <p:set>
                                       <p:cBhvr>
@@ -6095,300 +5900,6 @@
                                           <p:spTgt spid="30">
                                             <p:txEl>
                                               <p:pRg st="0" end="0"/>
-                                            </p:txEl>
-                                          </p:spTgt>
-                                        </p:tgtEl>
-                                        <p:attrNameLst>
-                                          <p:attrName>style.visibility</p:attrName>
-                                        </p:attrNameLst>
-                                      </p:cBhvr>
-                                      <p:to>
-                                        <p:strVal val="visible"/>
-                                      </p:to>
-                                    </p:set>
-                                  </p:childTnLst>
-                                </p:cTn>
-                              </p:par>
-                            </p:childTnLst>
-                          </p:cTn>
-                        </p:par>
-                      </p:childTnLst>
-                    </p:cTn>
-                  </p:par>
-                  <p:par>
-                    <p:cTn id="7" fill="hold">
-                      <p:stCondLst>
-                        <p:cond delay="indefinite"/>
-                      </p:stCondLst>
-                      <p:childTnLst>
-                        <p:par>
-                          <p:cTn id="8" fill="hold">
-                            <p:stCondLst>
-                              <p:cond delay="0"/>
-                            </p:stCondLst>
-                            <p:childTnLst>
-                              <p:par>
-                                <p:cTn id="9" presetID="1" presetClass="entr" presetSubtype="0" fill="hold" nodeType="clickEffect">
-                                  <p:stCondLst>
-                                    <p:cond delay="0"/>
-                                  </p:stCondLst>
-                                  <p:childTnLst>
-                                    <p:set>
-                                      <p:cBhvr>
-                                        <p:cTn id="10" dur="1" fill="hold">
-                                          <p:stCondLst>
-                                            <p:cond delay="0"/>
-                                          </p:stCondLst>
-                                        </p:cTn>
-                                        <p:tgtEl>
-                                          <p:spTgt spid="30">
-                                            <p:txEl>
-                                              <p:pRg st="1" end="1"/>
-                                            </p:txEl>
-                                          </p:spTgt>
-                                        </p:tgtEl>
-                                        <p:attrNameLst>
-                                          <p:attrName>style.visibility</p:attrName>
-                                        </p:attrNameLst>
-                                      </p:cBhvr>
-                                      <p:to>
-                                        <p:strVal val="visible"/>
-                                      </p:to>
-                                    </p:set>
-                                  </p:childTnLst>
-                                </p:cTn>
-                              </p:par>
-                            </p:childTnLst>
-                          </p:cTn>
-                        </p:par>
-                      </p:childTnLst>
-                    </p:cTn>
-                  </p:par>
-                  <p:par>
-                    <p:cTn id="11" fill="hold">
-                      <p:stCondLst>
-                        <p:cond delay="indefinite"/>
-                      </p:stCondLst>
-                      <p:childTnLst>
-                        <p:par>
-                          <p:cTn id="12" fill="hold">
-                            <p:stCondLst>
-                              <p:cond delay="0"/>
-                            </p:stCondLst>
-                            <p:childTnLst>
-                              <p:par>
-                                <p:cTn id="13" presetID="1" presetClass="entr" presetSubtype="0" fill="hold" nodeType="clickEffect">
-                                  <p:stCondLst>
-                                    <p:cond delay="0"/>
-                                  </p:stCondLst>
-                                  <p:childTnLst>
-                                    <p:set>
-                                      <p:cBhvr>
-                                        <p:cTn id="14" dur="1" fill="hold">
-                                          <p:stCondLst>
-                                            <p:cond delay="0"/>
-                                          </p:stCondLst>
-                                        </p:cTn>
-                                        <p:tgtEl>
-                                          <p:spTgt spid="30">
-                                            <p:txEl>
-                                              <p:pRg st="2" end="2"/>
-                                            </p:txEl>
-                                          </p:spTgt>
-                                        </p:tgtEl>
-                                        <p:attrNameLst>
-                                          <p:attrName>style.visibility</p:attrName>
-                                        </p:attrNameLst>
-                                      </p:cBhvr>
-                                      <p:to>
-                                        <p:strVal val="visible"/>
-                                      </p:to>
-                                    </p:set>
-                                  </p:childTnLst>
-                                </p:cTn>
-                              </p:par>
-                            </p:childTnLst>
-                          </p:cTn>
-                        </p:par>
-                      </p:childTnLst>
-                    </p:cTn>
-                  </p:par>
-                  <p:par>
-                    <p:cTn id="15" fill="hold">
-                      <p:stCondLst>
-                        <p:cond delay="indefinite"/>
-                      </p:stCondLst>
-                      <p:childTnLst>
-                        <p:par>
-                          <p:cTn id="16" fill="hold">
-                            <p:stCondLst>
-                              <p:cond delay="0"/>
-                            </p:stCondLst>
-                            <p:childTnLst>
-                              <p:par>
-                                <p:cTn id="17" presetID="1" presetClass="entr" presetSubtype="0" fill="hold" nodeType="clickEffect">
-                                  <p:stCondLst>
-                                    <p:cond delay="0"/>
-                                  </p:stCondLst>
-                                  <p:childTnLst>
-                                    <p:set>
-                                      <p:cBhvr>
-                                        <p:cTn id="18" dur="1" fill="hold">
-                                          <p:stCondLst>
-                                            <p:cond delay="0"/>
-                                          </p:stCondLst>
-                                        </p:cTn>
-                                        <p:tgtEl>
-                                          <p:spTgt spid="30">
-                                            <p:txEl>
-                                              <p:pRg st="3" end="3"/>
-                                            </p:txEl>
-                                          </p:spTgt>
-                                        </p:tgtEl>
-                                        <p:attrNameLst>
-                                          <p:attrName>style.visibility</p:attrName>
-                                        </p:attrNameLst>
-                                      </p:cBhvr>
-                                      <p:to>
-                                        <p:strVal val="visible"/>
-                                      </p:to>
-                                    </p:set>
-                                  </p:childTnLst>
-                                </p:cTn>
-                              </p:par>
-                            </p:childTnLst>
-                          </p:cTn>
-                        </p:par>
-                      </p:childTnLst>
-                    </p:cTn>
-                  </p:par>
-                  <p:par>
-                    <p:cTn id="19" fill="hold">
-                      <p:stCondLst>
-                        <p:cond delay="indefinite"/>
-                      </p:stCondLst>
-                      <p:childTnLst>
-                        <p:par>
-                          <p:cTn id="20" fill="hold">
-                            <p:stCondLst>
-                              <p:cond delay="0"/>
-                            </p:stCondLst>
-                            <p:childTnLst>
-                              <p:par>
-                                <p:cTn id="21" presetID="1" presetClass="entr" presetSubtype="0" fill="hold" nodeType="clickEffect">
-                                  <p:stCondLst>
-                                    <p:cond delay="0"/>
-                                  </p:stCondLst>
-                                  <p:childTnLst>
-                                    <p:set>
-                                      <p:cBhvr>
-                                        <p:cTn id="22" dur="1" fill="hold">
-                                          <p:stCondLst>
-                                            <p:cond delay="0"/>
-                                          </p:stCondLst>
-                                        </p:cTn>
-                                        <p:tgtEl>
-                                          <p:spTgt spid="30">
-                                            <p:txEl>
-                                              <p:pRg st="4" end="4"/>
-                                            </p:txEl>
-                                          </p:spTgt>
-                                        </p:tgtEl>
-                                        <p:attrNameLst>
-                                          <p:attrName>style.visibility</p:attrName>
-                                        </p:attrNameLst>
-                                      </p:cBhvr>
-                                      <p:to>
-                                        <p:strVal val="visible"/>
-                                      </p:to>
-                                    </p:set>
-                                  </p:childTnLst>
-                                </p:cTn>
-                              </p:par>
-                            </p:childTnLst>
-                          </p:cTn>
-                        </p:par>
-                      </p:childTnLst>
-                    </p:cTn>
-                  </p:par>
-                  <p:par>
-                    <p:cTn id="23" fill="hold">
-                      <p:stCondLst>
-                        <p:cond delay="indefinite"/>
-                      </p:stCondLst>
-                      <p:childTnLst>
-                        <p:par>
-                          <p:cTn id="24" fill="hold">
-                            <p:stCondLst>
-                              <p:cond delay="0"/>
-                            </p:stCondLst>
-                            <p:childTnLst>
-                              <p:par>
-                                <p:cTn id="25" presetID="1" presetClass="entr" presetSubtype="0" fill="hold" nodeType="clickEffect">
-                                  <p:stCondLst>
-                                    <p:cond delay="0"/>
-                                  </p:stCondLst>
-                                  <p:childTnLst>
-                                    <p:set>
-                                      <p:cBhvr>
-                                        <p:cTn id="26" dur="1" fill="hold">
-                                          <p:stCondLst>
-                                            <p:cond delay="0"/>
-                                          </p:stCondLst>
-                                        </p:cTn>
-                                        <p:tgtEl>
-                                          <p:spTgt spid="30">
-                                            <p:txEl>
-                                              <p:pRg st="5" end="5"/>
-                                            </p:txEl>
-                                          </p:spTgt>
-                                        </p:tgtEl>
-                                        <p:attrNameLst>
-                                          <p:attrName>style.visibility</p:attrName>
-                                        </p:attrNameLst>
-                                      </p:cBhvr>
-                                      <p:to>
-                                        <p:strVal val="visible"/>
-                                      </p:to>
-                                    </p:set>
-                                  </p:childTnLst>
-                                </p:cTn>
-                              </p:par>
-                            </p:childTnLst>
-                          </p:cTn>
-                        </p:par>
-                      </p:childTnLst>
-                    </p:cTn>
-                  </p:par>
-                  <p:par>
-                    <p:cTn id="27" fill="hold">
-                      <p:stCondLst>
-                        <p:cond delay="indefinite"/>
-                      </p:stCondLst>
-                      <p:childTnLst>
-                        <p:par>
-                          <p:cTn id="28" fill="hold">
-                            <p:stCondLst>
-                              <p:cond delay="0"/>
-                            </p:stCondLst>
-                            <p:childTnLst>
-                              <p:par>
-                                <p:cTn id="29" presetID="1" presetClass="entr" presetSubtype="0" fill="hold" nodeType="clickEffect">
-                                  <p:stCondLst>
-                                    <p:cond delay="0"/>
-                                  </p:stCondLst>
-                                  <p:childTnLst>
-                                    <p:set>
-                                      <p:cBhvr>
-                                        <p:cTn id="30" dur="1" fill="hold">
-                                          <p:stCondLst>
-                                            <p:cond delay="0"/>
-                                          </p:stCondLst>
-                                        </p:cTn>
-                                        <p:tgtEl>
-                                          <p:spTgt spid="30">
-                                            <p:txEl>
-                                              <p:pRg st="6" end="6"/>
                                             </p:txEl>
                                           </p:spTgt>
                                         </p:tgtEl>
@@ -6456,7 +5967,7 @@
           <p:cNvPr id="2" name="Title 1">
             <a:extLst>
               <a:ext uri="{FF2B5EF4-FFF2-40B4-BE49-F238E27FC236}">
-                <a16:creationId xmlns:a16="http://schemas.microsoft.com/office/drawing/2014/main" id="{EB10B0E3-1E86-4F05-BFFE-8F51202448A9}"/>
+                <a16:creationId xmlns:a16="http://schemas.microsoft.com/office/drawing/2014/main" id="{B6CDA166-D565-4795-B1AA-87976669D899}"/>
               </a:ext>
             </a:extLst>
           </p:cNvPr>
@@ -6467,44 +5978,422 @@
             <p:ph type="title"/>
           </p:nvPr>
         </p:nvSpPr>
-        <p:spPr/>
+        <p:spPr>
+          <a:xfrm>
+            <a:off x="457200" y="304800"/>
+            <a:ext cx="8229600" cy="1143000"/>
+          </a:xfrm>
+        </p:spPr>
         <p:txBody>
           <a:bodyPr/>
           <a:lstStyle/>
           <a:p>
-            <a:endParaRPr lang="en-US"/>
-          </a:p>
-        </p:txBody>
-      </p:sp>
-      <p:sp>
-        <p:nvSpPr>
-          <p:cNvPr id="3" name="Content Placeholder 2">
+            <a:r>
+              <a:rPr lang="en-US" dirty="0"/>
+              <a:t>Statistical significance of variables</a:t>
+            </a:r>
+          </a:p>
+        </p:txBody>
+      </p:sp>
+      <p:graphicFrame>
+        <p:nvGraphicFramePr>
+          <p:cNvPr id="4" name="Table 4">
             <a:extLst>
               <a:ext uri="{FF2B5EF4-FFF2-40B4-BE49-F238E27FC236}">
-                <a16:creationId xmlns:a16="http://schemas.microsoft.com/office/drawing/2014/main" id="{A293D2A9-1E06-4D1B-8150-7CF55B09A846}"/>
+                <a16:creationId xmlns:a16="http://schemas.microsoft.com/office/drawing/2014/main" id="{C31553A5-5FEC-47AD-B734-E5F229DAE130}"/>
               </a:ext>
             </a:extLst>
           </p:cNvPr>
-          <p:cNvSpPr>
-            <a:spLocks noGrp="1"/>
-          </p:cNvSpPr>
+          <p:cNvGraphicFramePr>
+            <a:graphicFrameLocks noGrp="1"/>
+          </p:cNvGraphicFramePr>
           <p:nvPr>
             <p:ph idx="1"/>
-          </p:nvPr>
-        </p:nvSpPr>
-        <p:spPr/>
-        <p:txBody>
-          <a:bodyPr/>
-          <a:lstStyle/>
-          <a:p>
-            <a:endParaRPr lang="en-US"/>
-          </a:p>
-        </p:txBody>
-      </p:sp>
+            <p:extLst>
+              <p:ext uri="{D42A27DB-BD31-4B8C-83A1-F6EECF244321}">
+                <p14:modId xmlns:p14="http://schemas.microsoft.com/office/powerpoint/2010/main" val="85047958"/>
+              </p:ext>
+            </p:extLst>
+          </p:nvPr>
+        </p:nvGraphicFramePr>
+        <p:xfrm>
+          <a:off x="457200" y="1600200"/>
+          <a:ext cx="8229600" cy="4572000"/>
+        </p:xfrm>
+        <a:graphic>
+          <a:graphicData uri="http://schemas.openxmlformats.org/drawingml/2006/table">
+            <a:tbl>
+              <a:tblPr firstRow="1" bandRow="1">
+                <a:tableStyleId>{5C22544A-7EE6-4342-B048-85BDC9FD1C3A}</a:tableStyleId>
+              </a:tblPr>
+              <a:tblGrid>
+                <a:gridCol w="4114800">
+                  <a:extLst>
+                    <a:ext uri="{9D8B030D-6E8A-4147-A177-3AD203B41FA5}">
+                      <a16:colId xmlns:a16="http://schemas.microsoft.com/office/drawing/2014/main" val="3658138492"/>
+                    </a:ext>
+                  </a:extLst>
+                </a:gridCol>
+                <a:gridCol w="4114800">
+                  <a:extLst>
+                    <a:ext uri="{9D8B030D-6E8A-4147-A177-3AD203B41FA5}">
+                      <a16:colId xmlns:a16="http://schemas.microsoft.com/office/drawing/2014/main" val="3593707040"/>
+                    </a:ext>
+                  </a:extLst>
+                </a:gridCol>
+              </a:tblGrid>
+              <a:tr h="370840">
+                <a:tc>
+                  <a:txBody>
+                    <a:bodyPr/>
+                    <a:lstStyle/>
+                    <a:p>
+                      <a:r>
+                        <a:rPr lang="en-IN" sz="2400" dirty="0"/>
+                        <a:t>Numerical</a:t>
+                      </a:r>
+                    </a:p>
+                  </a:txBody>
+                  <a:tcPr/>
+                </a:tc>
+                <a:tc>
+                  <a:txBody>
+                    <a:bodyPr/>
+                    <a:lstStyle/>
+                    <a:p>
+                      <a:r>
+                        <a:rPr lang="en-IN" sz="2400" dirty="0"/>
+                        <a:t>Categorical</a:t>
+                      </a:r>
+                    </a:p>
+                  </a:txBody>
+                  <a:tcPr/>
+                </a:tc>
+                <a:extLst>
+                  <a:ext uri="{0D108BD9-81ED-4DB2-BD59-A6C34878D82A}">
+                    <a16:rowId xmlns:a16="http://schemas.microsoft.com/office/drawing/2014/main" val="160021087"/>
+                  </a:ext>
+                </a:extLst>
+              </a:tr>
+              <a:tr h="370840">
+                <a:tc>
+                  <a:txBody>
+                    <a:bodyPr/>
+                    <a:lstStyle/>
+                    <a:p>
+                      <a:r>
+                        <a:rPr lang="en-IN" sz="2400" dirty="0"/>
+                        <a:t>Disbursed amount</a:t>
+                      </a:r>
+                    </a:p>
+                  </a:txBody>
+                  <a:tcPr/>
+                </a:tc>
+                <a:tc>
+                  <a:txBody>
+                    <a:bodyPr/>
+                    <a:lstStyle/>
+                    <a:p>
+                      <a:r>
+                        <a:rPr lang="en-IN" sz="2400" dirty="0"/>
+                        <a:t>No. of accounts</a:t>
+                      </a:r>
+                    </a:p>
+                  </a:txBody>
+                  <a:tcPr/>
+                </a:tc>
+                <a:extLst>
+                  <a:ext uri="{0D108BD9-81ED-4DB2-BD59-A6C34878D82A}">
+                    <a16:rowId xmlns:a16="http://schemas.microsoft.com/office/drawing/2014/main" val="323034610"/>
+                  </a:ext>
+                </a:extLst>
+              </a:tr>
+              <a:tr h="370840">
+                <a:tc>
+                  <a:txBody>
+                    <a:bodyPr/>
+                    <a:lstStyle/>
+                    <a:p>
+                      <a:r>
+                        <a:rPr lang="en-IN" sz="2400" dirty="0"/>
+                        <a:t>Asset cost</a:t>
+                      </a:r>
+                    </a:p>
+                  </a:txBody>
+                  <a:tcPr/>
+                </a:tc>
+                <a:tc>
+                  <a:txBody>
+                    <a:bodyPr/>
+                    <a:lstStyle/>
+                    <a:p>
+                      <a:r>
+                        <a:rPr lang="en-IN" sz="2400" dirty="0"/>
+                        <a:t>Active accounts</a:t>
+                      </a:r>
+                    </a:p>
+                  </a:txBody>
+                  <a:tcPr/>
+                </a:tc>
+                <a:extLst>
+                  <a:ext uri="{0D108BD9-81ED-4DB2-BD59-A6C34878D82A}">
+                    <a16:rowId xmlns:a16="http://schemas.microsoft.com/office/drawing/2014/main" val="2332941236"/>
+                  </a:ext>
+                </a:extLst>
+              </a:tr>
+              <a:tr h="370840">
+                <a:tc>
+                  <a:txBody>
+                    <a:bodyPr/>
+                    <a:lstStyle/>
+                    <a:p>
+                      <a:r>
+                        <a:rPr lang="en-IN" sz="2400" dirty="0"/>
+                        <a:t>loan-to-value ratio</a:t>
+                      </a:r>
+                    </a:p>
+                  </a:txBody>
+                  <a:tcPr/>
+                </a:tc>
+                <a:tc>
+                  <a:txBody>
+                    <a:bodyPr/>
+                    <a:lstStyle/>
+                    <a:p>
+                      <a:r>
+                        <a:rPr lang="en-IN" sz="2400" dirty="0"/>
+                        <a:t>Overdue accounts</a:t>
+                      </a:r>
+                    </a:p>
+                  </a:txBody>
+                  <a:tcPr/>
+                </a:tc>
+                <a:extLst>
+                  <a:ext uri="{0D108BD9-81ED-4DB2-BD59-A6C34878D82A}">
+                    <a16:rowId xmlns:a16="http://schemas.microsoft.com/office/drawing/2014/main" val="2130091456"/>
+                  </a:ext>
+                </a:extLst>
+              </a:tr>
+              <a:tr h="370840">
+                <a:tc>
+                  <a:txBody>
+                    <a:bodyPr/>
+                    <a:lstStyle/>
+                    <a:p>
+                      <a:r>
+                        <a:rPr lang="en-IN" sz="2400" dirty="0"/>
+                        <a:t>current-balance</a:t>
+                      </a:r>
+                    </a:p>
+                  </a:txBody>
+                  <a:tcPr/>
+                </a:tc>
+                <a:tc>
+                  <a:txBody>
+                    <a:bodyPr/>
+                    <a:lstStyle/>
+                    <a:p>
+                      <a:r>
+                        <a:rPr lang="en-IN" sz="2400" dirty="0"/>
+                        <a:t>Primary current balance</a:t>
+                      </a:r>
+                    </a:p>
+                  </a:txBody>
+                  <a:tcPr/>
+                </a:tc>
+                <a:extLst>
+                  <a:ext uri="{0D108BD9-81ED-4DB2-BD59-A6C34878D82A}">
+                    <a16:rowId xmlns:a16="http://schemas.microsoft.com/office/drawing/2014/main" val="16964432"/>
+                  </a:ext>
+                </a:extLst>
+              </a:tr>
+              <a:tr h="370840">
+                <a:tc>
+                  <a:txBody>
+                    <a:bodyPr/>
+                    <a:lstStyle/>
+                    <a:p>
+                      <a:r>
+                        <a:rPr lang="en-IN" sz="2400" dirty="0" err="1"/>
+                        <a:t>installment</a:t>
+                      </a:r>
+                      <a:r>
+                        <a:rPr lang="en-IN" sz="2400" dirty="0"/>
+                        <a:t>-amount</a:t>
+                      </a:r>
+                    </a:p>
+                  </a:txBody>
+                  <a:tcPr/>
+                </a:tc>
+                <a:tc>
+                  <a:txBody>
+                    <a:bodyPr/>
+                    <a:lstStyle/>
+                    <a:p>
+                      <a:r>
+                        <a:rPr lang="en-IN" sz="2400" dirty="0"/>
+                        <a:t>New accounts in last 6 months</a:t>
+                      </a:r>
+                    </a:p>
+                  </a:txBody>
+                  <a:tcPr/>
+                </a:tc>
+                <a:extLst>
+                  <a:ext uri="{0D108BD9-81ED-4DB2-BD59-A6C34878D82A}">
+                    <a16:rowId xmlns:a16="http://schemas.microsoft.com/office/drawing/2014/main" val="3877611599"/>
+                  </a:ext>
+                </a:extLst>
+              </a:tr>
+              <a:tr h="370840">
+                <a:tc>
+                  <a:txBody>
+                    <a:bodyPr/>
+                    <a:lstStyle/>
+                    <a:p>
+                      <a:endParaRPr lang="en-IN" sz="2400"/>
+                    </a:p>
+                  </a:txBody>
+                  <a:tcPr/>
+                </a:tc>
+                <a:tc>
+                  <a:txBody>
+                    <a:bodyPr/>
+                    <a:lstStyle/>
+                    <a:p>
+                      <a:r>
+                        <a:rPr lang="en-IN" sz="2400" dirty="0"/>
+                        <a:t>No of inquiries</a:t>
+                      </a:r>
+                    </a:p>
+                  </a:txBody>
+                  <a:tcPr/>
+                </a:tc>
+                <a:extLst>
+                  <a:ext uri="{0D108BD9-81ED-4DB2-BD59-A6C34878D82A}">
+                    <a16:rowId xmlns:a16="http://schemas.microsoft.com/office/drawing/2014/main" val="2266630915"/>
+                  </a:ext>
+                </a:extLst>
+              </a:tr>
+              <a:tr h="370840">
+                <a:tc>
+                  <a:txBody>
+                    <a:bodyPr/>
+                    <a:lstStyle/>
+                    <a:p>
+                      <a:endParaRPr lang="en-IN" sz="2400" dirty="0"/>
+                    </a:p>
+                  </a:txBody>
+                  <a:tcPr/>
+                </a:tc>
+                <a:tc>
+                  <a:txBody>
+                    <a:bodyPr/>
+                    <a:lstStyle/>
+                    <a:p>
+                      <a:r>
+                        <a:rPr lang="en-IN" sz="2400" dirty="0" err="1"/>
+                        <a:t>Avg</a:t>
+                      </a:r>
+                      <a:r>
+                        <a:rPr lang="en-IN" sz="2400" dirty="0"/>
+                        <a:t> Loan tenure</a:t>
+                      </a:r>
+                    </a:p>
+                  </a:txBody>
+                  <a:tcPr/>
+                </a:tc>
+                <a:extLst>
+                  <a:ext uri="{0D108BD9-81ED-4DB2-BD59-A6C34878D82A}">
+                    <a16:rowId xmlns:a16="http://schemas.microsoft.com/office/drawing/2014/main" val="1936936436"/>
+                  </a:ext>
+                </a:extLst>
+              </a:tr>
+              <a:tr h="370840">
+                <a:tc>
+                  <a:txBody>
+                    <a:bodyPr/>
+                    <a:lstStyle/>
+                    <a:p>
+                      <a:endParaRPr lang="en-IN" sz="2400"/>
+                    </a:p>
+                  </a:txBody>
+                  <a:tcPr/>
+                </a:tc>
+                <a:tc>
+                  <a:txBody>
+                    <a:bodyPr/>
+                    <a:lstStyle/>
+                    <a:p>
+                      <a:r>
+                        <a:rPr lang="en-IN" sz="2400" dirty="0"/>
+                        <a:t>Time_since_1st_loan</a:t>
+                      </a:r>
+                    </a:p>
+                  </a:txBody>
+                  <a:tcPr/>
+                </a:tc>
+                <a:extLst>
+                  <a:ext uri="{0D108BD9-81ED-4DB2-BD59-A6C34878D82A}">
+                    <a16:rowId xmlns:a16="http://schemas.microsoft.com/office/drawing/2014/main" val="3429131410"/>
+                  </a:ext>
+                </a:extLst>
+              </a:tr>
+              <a:tr h="370840">
+                <a:tc>
+                  <a:txBody>
+                    <a:bodyPr/>
+                    <a:lstStyle/>
+                    <a:p>
+                      <a:endParaRPr lang="en-IN" sz="2400"/>
+                    </a:p>
+                  </a:txBody>
+                  <a:tcPr/>
+                </a:tc>
+                <a:tc>
+                  <a:txBody>
+                    <a:bodyPr/>
+                    <a:lstStyle/>
+                    <a:p>
+                      <a:pPr marL="0" marR="0" lvl="0" indent="0" algn="l" defTabSz="914400" rtl="0" eaLnBrk="1" fontAlgn="auto" latinLnBrk="0" hangingPunct="1">
+                        <a:lnSpc>
+                          <a:spcPct val="100000"/>
+                        </a:lnSpc>
+                        <a:spcBef>
+                          <a:spcPts val="0"/>
+                        </a:spcBef>
+                        <a:spcAft>
+                          <a:spcPts val="0"/>
+                        </a:spcAft>
+                        <a:buClrTx/>
+                        <a:buSzTx/>
+                        <a:buFontTx/>
+                        <a:buNone/>
+                        <a:tabLst/>
+                        <a:defRPr/>
+                      </a:pPr>
+                      <a:r>
+                        <a:rPr lang="en-IN" sz="2400" dirty="0" err="1"/>
+                        <a:t>Age_at_disbursal</a:t>
+                      </a:r>
+                      <a:endParaRPr lang="en-IN" sz="2400" dirty="0"/>
+                    </a:p>
+                  </a:txBody>
+                  <a:tcPr/>
+                </a:tc>
+                <a:extLst>
+                  <a:ext uri="{0D108BD9-81ED-4DB2-BD59-A6C34878D82A}">
+                    <a16:rowId xmlns:a16="http://schemas.microsoft.com/office/drawing/2014/main" val="2041702499"/>
+                  </a:ext>
+                </a:extLst>
+              </a:tr>
+            </a:tbl>
+          </a:graphicData>
+        </a:graphic>
+      </p:graphicFrame>
     </p:spTree>
     <p:extLst>
       <p:ext uri="{BB962C8B-B14F-4D97-AF65-F5344CB8AC3E}">
-        <p14:creationId xmlns:p14="http://schemas.microsoft.com/office/powerpoint/2010/main" val="942022588"/>
+        <p14:creationId xmlns:p14="http://schemas.microsoft.com/office/powerpoint/2010/main" val="146618133"/>
       </p:ext>
     </p:extLst>
   </p:cSld>
@@ -6536,7 +6425,7 @@
           <p:cNvPr id="2" name="Title 1">
             <a:extLst>
               <a:ext uri="{FF2B5EF4-FFF2-40B4-BE49-F238E27FC236}">
-                <a16:creationId xmlns:a16="http://schemas.microsoft.com/office/drawing/2014/main" id="{B6CDA166-D565-4795-B1AA-87976669D899}"/>
+                <a16:creationId xmlns:a16="http://schemas.microsoft.com/office/drawing/2014/main" id="{541A397E-F577-49FF-BC80-010E4660590D}"/>
               </a:ext>
             </a:extLst>
           </p:cNvPr>
@@ -6552,7 +6441,10 @@
           <a:bodyPr/>
           <a:lstStyle/>
           <a:p>
-            <a:endParaRPr lang="en-US"/>
+            <a:r>
+              <a:rPr lang="en-US" dirty="0"/>
+              <a:t>Feature Engineering</a:t>
+            </a:r>
           </a:p>
         </p:txBody>
       </p:sp>
@@ -6561,7 +6453,7 @@
           <p:cNvPr id="3" name="Content Placeholder 2">
             <a:extLst>
               <a:ext uri="{FF2B5EF4-FFF2-40B4-BE49-F238E27FC236}">
-                <a16:creationId xmlns:a16="http://schemas.microsoft.com/office/drawing/2014/main" id="{1AD90108-7148-4F1B-A063-C3F518C6EC3F}"/>
+                <a16:creationId xmlns:a16="http://schemas.microsoft.com/office/drawing/2014/main" id="{4887195E-57E5-4EF2-9755-BE81F07132A4}"/>
               </a:ext>
             </a:extLst>
           </p:cNvPr>
@@ -6574,17 +6466,95 @@
         </p:nvSpPr>
         <p:spPr/>
         <p:txBody>
-          <a:bodyPr/>
+          <a:bodyPr>
+            <a:normAutofit/>
+          </a:bodyPr>
           <a:lstStyle/>
           <a:p>
-            <a:endParaRPr lang="en-US"/>
+            <a:pPr marL="0" indent="0">
+              <a:buNone/>
+            </a:pPr>
+            <a:r>
+              <a:rPr lang="en-IN" sz="2400" dirty="0"/>
+              <a:t>1. </a:t>
+            </a:r>
+            <a:r>
+              <a:rPr lang="en-IN" sz="2400" b="1" dirty="0"/>
+              <a:t>Transformations</a:t>
+            </a:r>
+            <a:r>
+              <a:rPr lang="en-IN" sz="2400" dirty="0"/>
+              <a:t> :</a:t>
+            </a:r>
+          </a:p>
+          <a:p>
+            <a:pPr marL="0" indent="0">
+              <a:buNone/>
+            </a:pPr>
+            <a:r>
+              <a:rPr lang="en-IN" sz="2400" dirty="0"/>
+              <a:t>Yes . Since the data is not normally distributed (Highly right skewed), We tried Log transform, Sqrt transform.</a:t>
+            </a:r>
+          </a:p>
+          <a:p>
+            <a:pPr marL="0" indent="0">
+              <a:buNone/>
+            </a:pPr>
+            <a:r>
+              <a:rPr lang="en-IN" sz="2400" dirty="0"/>
+              <a:t>2. </a:t>
+            </a:r>
+            <a:r>
+              <a:rPr lang="en-IN" sz="2400" b="1" dirty="0"/>
+              <a:t>Scaling the data </a:t>
+            </a:r>
+            <a:r>
+              <a:rPr lang="en-IN" sz="2400" dirty="0"/>
+              <a:t>:</a:t>
+            </a:r>
+          </a:p>
+          <a:p>
+            <a:pPr marL="0" indent="0">
+              <a:buNone/>
+            </a:pPr>
+            <a:r>
+              <a:rPr lang="en-IN" sz="2400" dirty="0"/>
+              <a:t>Yes, the data has been scaled.</a:t>
+            </a:r>
+          </a:p>
+          <a:p>
+            <a:pPr marL="0" indent="0">
+              <a:buNone/>
+            </a:pPr>
+            <a:r>
+              <a:rPr lang="en-IN" sz="2400" dirty="0"/>
+              <a:t>3. </a:t>
+            </a:r>
+            <a:r>
+              <a:rPr lang="en-IN" sz="2400" b="1" dirty="0"/>
+              <a:t>Dimensionality reduction </a:t>
+            </a:r>
+            <a:r>
+              <a:rPr lang="en-IN" sz="2400" dirty="0"/>
+              <a:t>:</a:t>
+            </a:r>
+          </a:p>
+          <a:p>
+            <a:pPr marL="0" indent="0">
+              <a:buNone/>
+            </a:pPr>
+            <a:r>
+              <a:rPr lang="en-IN" sz="2400" dirty="0"/>
+              <a:t> Since there is no multicollinearity in our data, We haven’t done PCA.</a:t>
+            </a:r>
+            <a:endParaRPr lang="en-US" sz="2400" dirty="0"/>
           </a:p>
         </p:txBody>
       </p:sp>
     </p:spTree>
     <p:extLst>
       <p:ext uri="{BB962C8B-B14F-4D97-AF65-F5344CB8AC3E}">
-        <p14:creationId xmlns:p14="http://schemas.microsoft.com/office/powerpoint/2010/main" val="146618133"/>
+        <p14:creationId xmlns:p14="http://schemas.microsoft.com/office/powerpoint/2010/main" val="3227524239"/>
       </p:ext>
     </p:extLst>
   </p:cSld>
@@ -6616,7 +6586,7 @@
           <p:cNvPr id="2" name="Title 1">
             <a:extLst>
               <a:ext uri="{FF2B5EF4-FFF2-40B4-BE49-F238E27FC236}">
-                <a16:creationId xmlns:a16="http://schemas.microsoft.com/office/drawing/2014/main" id="{541A397E-F577-49FF-BC80-010E4660590D}"/>
+                <a16:creationId xmlns:a16="http://schemas.microsoft.com/office/drawing/2014/main" id="{F6584AFD-6D6B-41BD-8AA7-E55CA8893D30}"/>
               </a:ext>
             </a:extLst>
           </p:cNvPr>
@@ -6632,7 +6602,10 @@
           <a:bodyPr/>
           <a:lstStyle/>
           <a:p>
-            <a:endParaRPr lang="en-US"/>
+            <a:r>
+              <a:rPr lang="en-US" dirty="0"/>
+              <a:t>Assumptions</a:t>
+            </a:r>
           </a:p>
         </p:txBody>
       </p:sp>
@@ -6641,7 +6614,7 @@
           <p:cNvPr id="3" name="Content Placeholder 2">
             <a:extLst>
               <a:ext uri="{FF2B5EF4-FFF2-40B4-BE49-F238E27FC236}">
-                <a16:creationId xmlns:a16="http://schemas.microsoft.com/office/drawing/2014/main" id="{4887195E-57E5-4EF2-9755-BE81F07132A4}"/>
+                <a16:creationId xmlns:a16="http://schemas.microsoft.com/office/drawing/2014/main" id="{1DD175B5-E4E4-4BD1-8A11-20DED898F8EA}"/>
               </a:ext>
             </a:extLst>
           </p:cNvPr>
@@ -6654,17 +6627,67 @@
         </p:nvSpPr>
         <p:spPr/>
         <p:txBody>
-          <a:bodyPr/>
+          <a:bodyPr>
+            <a:normAutofit/>
+          </a:bodyPr>
           <a:lstStyle/>
           <a:p>
-            <a:endParaRPr lang="en-US"/>
+            <a:r>
+              <a:rPr lang="en-IN" sz="2400" b="1" dirty="0"/>
+              <a:t>General Assumptions: </a:t>
+            </a:r>
+          </a:p>
+          <a:p>
+            <a:pPr marL="0" indent="0">
+              <a:buNone/>
+            </a:pPr>
+            <a:r>
+              <a:rPr lang="en-IN" sz="2400" dirty="0"/>
+              <a:t>      -&gt; No redundant data.</a:t>
+            </a:r>
+          </a:p>
+          <a:p>
+            <a:pPr marL="0" indent="0">
+              <a:buNone/>
+            </a:pPr>
+            <a:r>
+              <a:rPr lang="en-IN" sz="2400" b="1" dirty="0"/>
+              <a:t>      </a:t>
+            </a:r>
+            <a:r>
+              <a:rPr lang="en-IN" sz="2400" dirty="0"/>
+              <a:t>-&gt; Absence of Multicollinearity</a:t>
+            </a:r>
+          </a:p>
+          <a:p>
+            <a:r>
+              <a:rPr lang="en-IN" sz="2400" b="1" dirty="0"/>
+              <a:t>Naive Bayes</a:t>
+            </a:r>
+            <a:r>
+              <a:rPr lang="en-US" sz="2400" b="1" dirty="0"/>
+              <a:t> -  </a:t>
+            </a:r>
+            <a:r>
+              <a:rPr lang="en-US" sz="2400" dirty="0"/>
+              <a:t>Attributes are conditionally independent.</a:t>
+            </a:r>
+          </a:p>
+          <a:p>
+            <a:r>
+              <a:rPr lang="en-US" sz="2400" dirty="0"/>
+              <a:t>Decision Tree, Random Forest, KNN – No assumptions</a:t>
+            </a:r>
+          </a:p>
+          <a:p>
+            <a:endParaRPr lang="en-IN" sz="2400" b="1" dirty="0"/>
           </a:p>
         </p:txBody>
       </p:sp>
     </p:spTree>
     <p:extLst>
       <p:ext uri="{BB962C8B-B14F-4D97-AF65-F5344CB8AC3E}">
-        <p14:creationId xmlns:p14="http://schemas.microsoft.com/office/powerpoint/2010/main" val="3227524239"/>
+        <p14:creationId xmlns:p14="http://schemas.microsoft.com/office/powerpoint/2010/main" val="1235205643"/>
       </p:ext>
     </p:extLst>
   </p:cSld>

</xml_diff>

<commit_message>
Updated Prabhas and Makapa's Slides
</commit_message>
<xml_diff>
--- a/Pravin Kumar/Vehicle Loan Default Prediction.pptx
+++ b/Pravin Kumar/Vehicle Loan Default Prediction.pptx
@@ -5,19 +5,18 @@
     <p:sldMasterId id="2147483648" r:id="rId1"/>
   </p:sldMasterIdLst>
   <p:notesMasterIdLst>
-    <p:notesMasterId r:id="rId12"/>
+    <p:notesMasterId r:id="rId11"/>
   </p:notesMasterIdLst>
   <p:sldIdLst>
     <p:sldId id="328" r:id="rId2"/>
-    <p:sldId id="329" r:id="rId3"/>
-    <p:sldId id="332" r:id="rId4"/>
-    <p:sldId id="330" r:id="rId5"/>
-    <p:sldId id="333" r:id="rId6"/>
-    <p:sldId id="331" r:id="rId7"/>
-    <p:sldId id="335" r:id="rId8"/>
-    <p:sldId id="337" r:id="rId9"/>
-    <p:sldId id="336" r:id="rId10"/>
-    <p:sldId id="263" r:id="rId11"/>
+    <p:sldId id="332" r:id="rId3"/>
+    <p:sldId id="329" r:id="rId4"/>
+    <p:sldId id="257" r:id="rId5"/>
+    <p:sldId id="258" r:id="rId6"/>
+    <p:sldId id="335" r:id="rId7"/>
+    <p:sldId id="337" r:id="rId8"/>
+    <p:sldId id="336" r:id="rId9"/>
+    <p:sldId id="263" r:id="rId10"/>
   </p:sldIdLst>
   <p:sldSz cx="9144000" cy="6858000" type="screen4x3"/>
   <p:notesSz cx="6858000" cy="9144000"/>
@@ -3881,7 +3880,122 @@
 </p:sld>
 </file>
 
-<file path=ppt/slides/slide10.xml><?xml version="1.0" encoding="utf-8"?>
+<file path=ppt/slides/slide2.xml><?xml version="1.0" encoding="utf-8"?>
+<p:sld xmlns:a="http://schemas.openxmlformats.org/drawingml/2006/main" xmlns:r="http://schemas.openxmlformats.org/officeDocument/2006/relationships" xmlns:p="http://schemas.openxmlformats.org/presentationml/2006/main">
+  <p:cSld>
+    <p:spTree>
+      <p:nvGrpSpPr>
+        <p:cNvPr id="1" name=""/>
+        <p:cNvGrpSpPr/>
+        <p:nvPr/>
+      </p:nvGrpSpPr>
+      <p:grpSpPr>
+        <a:xfrm>
+          <a:off x="0" y="0"/>
+          <a:ext cx="0" cy="0"/>
+          <a:chOff x="0" y="0"/>
+          <a:chExt cx="0" cy="0"/>
+        </a:xfrm>
+      </p:grpSpPr>
+      <p:sp>
+        <p:nvSpPr>
+          <p:cNvPr id="2" name="Title 1">
+            <a:extLst>
+              <a:ext uri="{FF2B5EF4-FFF2-40B4-BE49-F238E27FC236}">
+                <a16:creationId xmlns:a16="http://schemas.microsoft.com/office/drawing/2014/main" id="{543925F3-AEA9-4425-BE85-A907329B807D}"/>
+              </a:ext>
+            </a:extLst>
+          </p:cNvPr>
+          <p:cNvSpPr>
+            <a:spLocks noGrp="1"/>
+          </p:cNvSpPr>
+          <p:nvPr>
+            <p:ph type="title"/>
+          </p:nvPr>
+        </p:nvSpPr>
+        <p:spPr/>
+        <p:txBody>
+          <a:bodyPr/>
+          <a:lstStyle/>
+          <a:p>
+            <a:pPr algn="l"/>
+            <a:r>
+              <a:rPr lang="en-US" dirty="0"/>
+              <a:t>Introduction</a:t>
+            </a:r>
+          </a:p>
+        </p:txBody>
+      </p:sp>
+      <p:sp>
+        <p:nvSpPr>
+          <p:cNvPr id="3" name="Content Placeholder 2">
+            <a:extLst>
+              <a:ext uri="{FF2B5EF4-FFF2-40B4-BE49-F238E27FC236}">
+                <a16:creationId xmlns:a16="http://schemas.microsoft.com/office/drawing/2014/main" id="{58171DD3-3E42-48DF-95D4-3408C189D523}"/>
+              </a:ext>
+            </a:extLst>
+          </p:cNvPr>
+          <p:cNvSpPr>
+            <a:spLocks noGrp="1"/>
+          </p:cNvSpPr>
+          <p:nvPr>
+            <p:ph idx="1"/>
+          </p:nvPr>
+        </p:nvSpPr>
+        <p:spPr>
+          <a:xfrm>
+            <a:off x="457200" y="1295400"/>
+            <a:ext cx="8686800" cy="5562600"/>
+          </a:xfrm>
+        </p:spPr>
+        <p:txBody>
+          <a:bodyPr>
+            <a:normAutofit fontScale="85000" lnSpcReduction="10000"/>
+          </a:bodyPr>
+          <a:lstStyle/>
+          <a:p>
+            <a:r>
+              <a:rPr lang="en-US" dirty="0"/>
+              <a:t>People avail vehicle loan from banks to buy their dream cars. Car loans have taken off in India witnessing an increase in growth of 18-20% which is a huge increase in 2019.</a:t>
+            </a:r>
+          </a:p>
+          <a:p>
+            <a:r>
+              <a:rPr lang="en-US" dirty="0"/>
+              <a:t>Bank and vehicle finance companies are making this dream come true by providing the vehicle loan facility. </a:t>
+            </a:r>
+          </a:p>
+          <a:p>
+            <a:r>
+              <a:rPr lang="en-US" dirty="0"/>
+              <a:t>Financing a vehicle involves a lot of technicalities like the kind of vehicle to be financed, the route on which the vehicle will be plying, the operating expenses of the customer, etc. </a:t>
+            </a:r>
+          </a:p>
+          <a:p>
+            <a:r>
+              <a:rPr lang="en-US" dirty="0"/>
+              <a:t>It is also being influenced by processing fee, loan clearance time, requirement of documentation and methodology being followed in computation of interest.</a:t>
+            </a:r>
+          </a:p>
+          <a:p>
+            <a:endParaRPr lang="en-US" dirty="0"/>
+          </a:p>
+        </p:txBody>
+      </p:sp>
+    </p:spTree>
+    <p:extLst>
+      <p:ext uri="{BB962C8B-B14F-4D97-AF65-F5344CB8AC3E}">
+        <p14:creationId xmlns:p14="http://schemas.microsoft.com/office/powerpoint/2010/main" val="3561413167"/>
+      </p:ext>
+    </p:extLst>
+  </p:cSld>
+  <p:clrMapOvr>
+    <a:masterClrMapping/>
+  </p:clrMapOvr>
+</p:sld>
+</file>
+
+<file path=ppt/slides/slide3.xml><?xml version="1.0" encoding="utf-8"?>
 <p:sld xmlns:a="http://schemas.openxmlformats.org/drawingml/2006/main" xmlns:r="http://schemas.openxmlformats.org/officeDocument/2006/relationships" xmlns:p="http://schemas.openxmlformats.org/presentationml/2006/main">
   <p:cSld>
     <p:spTree>
@@ -3992,7 +4106,7 @@
       </p:sp>
       <p:sp>
         <p:nvSpPr>
-          <p:cNvPr id="9" name="Content Placeholder 2"/>
+          <p:cNvPr id="30" name="Content Placeholder 2"/>
           <p:cNvSpPr txBox="1">
             <a:spLocks/>
           </p:cNvSpPr>
@@ -4000,8 +4114,8 @@
         </p:nvSpPr>
         <p:spPr>
           <a:xfrm>
-            <a:off x="3042062" y="1958439"/>
-            <a:ext cx="4730338" cy="1546761"/>
+            <a:off x="429658" y="980501"/>
+            <a:ext cx="8485742" cy="5648899"/>
           </a:xfrm>
           <a:prstGeom prst="rect">
             <a:avLst/>
@@ -4009,7 +4123,7 @@
         </p:spPr>
         <p:txBody>
           <a:bodyPr vert="horz" lIns="91440" tIns="45720" rIns="91440" bIns="45720" rtlCol="0">
-            <a:normAutofit/>
+            <a:normAutofit lnSpcReduction="10000"/>
           </a:bodyPr>
           <a:lstStyle>
             <a:lvl1pPr marL="0" indent="0" algn="ctr" defTabSz="914400" rtl="0" eaLnBrk="1" latinLnBrk="0" hangingPunct="1">
@@ -4167,351 +4281,121 @@
             </a:lvl9pPr>
           </a:lstStyle>
           <a:p>
-            <a:pPr lvl="1" algn="l"/>
-            <a:endParaRPr lang="en-IN" sz="4000" dirty="0">
+            <a:pPr marL="342900" indent="-342900" algn="l">
+              <a:buFont typeface="Arial" panose="020B0604020202020204" pitchFamily="34" charset="0"/>
+              <a:buChar char="•"/>
+            </a:pPr>
+            <a:r>
+              <a:rPr lang="en-IN" sz="2400" dirty="0">
+                <a:solidFill>
+                  <a:schemeClr val="tx1"/>
+                </a:solidFill>
+              </a:rPr>
+              <a:t>The objective of this project is to predict whether the customer will default based on these critical features.</a:t>
+            </a:r>
+          </a:p>
+          <a:p>
+            <a:pPr marL="914400" lvl="1" indent="-457200" algn="l">
+              <a:buFont typeface="Arial" panose="020B0604020202020204" pitchFamily="34" charset="0"/>
+              <a:buChar char="•"/>
+            </a:pPr>
+            <a:r>
+              <a:rPr lang="en-US" sz="2200" dirty="0">
+                <a:solidFill>
+                  <a:schemeClr val="tx1"/>
+                </a:solidFill>
+              </a:rPr>
+              <a:t>To find out consumers’ awareness about vehicle finance activities </a:t>
+            </a:r>
+          </a:p>
+          <a:p>
+            <a:pPr marL="914400" lvl="1" indent="-457200" algn="l">
+              <a:buFont typeface="Arial" panose="020B0604020202020204" pitchFamily="34" charset="0"/>
+              <a:buChar char="•"/>
+            </a:pPr>
+            <a:r>
+              <a:rPr lang="en-US" sz="2200" dirty="0">
+                <a:solidFill>
+                  <a:schemeClr val="tx1"/>
+                </a:solidFill>
+              </a:rPr>
+              <a:t>  To identify reasons for availing of vehicle finance </a:t>
+            </a:r>
+          </a:p>
+          <a:p>
+            <a:pPr marL="914400" lvl="1" indent="-457200" algn="l">
+              <a:buFont typeface="Arial" panose="020B0604020202020204" pitchFamily="34" charset="0"/>
+              <a:buChar char="•"/>
+            </a:pPr>
+            <a:r>
+              <a:rPr lang="en-US" sz="2200" dirty="0">
+                <a:solidFill>
+                  <a:schemeClr val="tx1"/>
+                </a:solidFill>
+              </a:rPr>
+              <a:t>To find out problem faced by consumers in availing of vehicle finance</a:t>
+            </a:r>
+          </a:p>
+          <a:p>
+            <a:pPr marL="800100" lvl="1" indent="-342900" algn="l">
+              <a:buFont typeface="Wingdings" panose="05000000000000000000" pitchFamily="2" charset="2"/>
+              <a:buChar char="Ø"/>
+            </a:pPr>
+            <a:endParaRPr lang="en-IN" sz="2000" dirty="0">
+              <a:solidFill>
+                <a:schemeClr val="tx1"/>
+              </a:solidFill>
+            </a:endParaRPr>
+          </a:p>
+          <a:p>
+            <a:pPr marL="342900" indent="-342900" algn="l">
+              <a:buFont typeface="Arial" panose="020B0604020202020204" pitchFamily="34" charset="0"/>
+              <a:buChar char="•"/>
+            </a:pPr>
+            <a:r>
+              <a:rPr lang="en-US" sz="2400" dirty="0">
+                <a:solidFill>
+                  <a:schemeClr val="tx1"/>
+                </a:solidFill>
+              </a:rPr>
+              <a:t>Finding out the critical features that to help him/the company to evaluate the probability of default of the customer, as well as prevent loosing out potential customers otherwise lost.</a:t>
+            </a:r>
+          </a:p>
+          <a:p>
+            <a:pPr marL="342900" indent="-342900" algn="l">
+              <a:buFont typeface="Arial" panose="020B0604020202020204" pitchFamily="34" charset="0"/>
+              <a:buChar char="•"/>
+            </a:pPr>
+            <a:r>
+              <a:rPr lang="en-US" sz="2400" dirty="0">
+                <a:solidFill>
+                  <a:schemeClr val="tx1"/>
+                </a:solidFill>
+              </a:rPr>
+              <a:t>Implementing a model that will help Banks to provide a better understanding about the customers and their status</a:t>
+            </a:r>
+          </a:p>
+          <a:p>
+            <a:pPr marL="342900" indent="-342900" algn="l">
+              <a:buFont typeface="Arial" panose="020B0604020202020204" pitchFamily="34" charset="0"/>
+              <a:buChar char="•"/>
+            </a:pPr>
+            <a:r>
+              <a:rPr lang="en-US" sz="2400" dirty="0">
+                <a:solidFill>
+                  <a:schemeClr val="tx1"/>
+                </a:solidFill>
+              </a:rPr>
+              <a:t>Reducing the losses suffered by the banks by availing loans to potential defaulters.</a:t>
+            </a:r>
+          </a:p>
+          <a:p>
+            <a:pPr algn="l"/>
+            <a:endParaRPr lang="en-US" sz="2400" dirty="0">
               <a:solidFill>
                 <a:srgbClr val="0055A0"/>
               </a:solidFill>
             </a:endParaRPr>
-          </a:p>
-          <a:p>
-            <a:pPr lvl="1" algn="l"/>
-            <a:r>
-              <a:rPr lang="en-IN" sz="4000" dirty="0">
-                <a:solidFill>
-                  <a:srgbClr val="0055A0"/>
-                </a:solidFill>
-              </a:rPr>
-              <a:t>Thanks!</a:t>
-            </a:r>
-          </a:p>
-        </p:txBody>
-      </p:sp>
-    </p:spTree>
-    <p:extLst>
-      <p:ext uri="{BB962C8B-B14F-4D97-AF65-F5344CB8AC3E}">
-        <p14:creationId xmlns:p14="http://schemas.microsoft.com/office/powerpoint/2010/main" val="3724216054"/>
-      </p:ext>
-    </p:extLst>
-  </p:cSld>
-  <p:clrMapOvr>
-    <a:masterClrMapping/>
-  </p:clrMapOvr>
-</p:sld>
-</file>
-
-<file path=ppt/slides/slide2.xml><?xml version="1.0" encoding="utf-8"?>
-<p:sld xmlns:a="http://schemas.openxmlformats.org/drawingml/2006/main" xmlns:r="http://schemas.openxmlformats.org/officeDocument/2006/relationships" xmlns:p="http://schemas.openxmlformats.org/presentationml/2006/main">
-  <p:cSld>
-    <p:spTree>
-      <p:nvGrpSpPr>
-        <p:cNvPr id="1" name=""/>
-        <p:cNvGrpSpPr/>
-        <p:nvPr/>
-      </p:nvGrpSpPr>
-      <p:grpSpPr>
-        <a:xfrm>
-          <a:off x="0" y="0"/>
-          <a:ext cx="0" cy="0"/>
-          <a:chOff x="0" y="0"/>
-          <a:chExt cx="0" cy="0"/>
-        </a:xfrm>
-      </p:grpSpPr>
-      <p:sp>
-        <p:nvSpPr>
-          <p:cNvPr id="4" name="Round Diagonal Corner Rectangle 3"/>
-          <p:cNvSpPr/>
-          <p:nvPr/>
-        </p:nvSpPr>
-        <p:spPr>
-          <a:xfrm>
-            <a:off x="45026" y="58880"/>
-            <a:ext cx="206087" cy="2209800"/>
-          </a:xfrm>
-          <a:prstGeom prst="round2DiagRect">
-            <a:avLst/>
-          </a:prstGeom>
-          <a:solidFill>
-            <a:srgbClr val="0070C0"/>
-          </a:solidFill>
-          <a:ln>
-            <a:solidFill>
-              <a:srgbClr val="0070C0"/>
-            </a:solidFill>
-          </a:ln>
-        </p:spPr>
-        <p:style>
-          <a:lnRef idx="2">
-            <a:schemeClr val="accent3"/>
-          </a:lnRef>
-          <a:fillRef idx="1">
-            <a:schemeClr val="lt1"/>
-          </a:fillRef>
-          <a:effectRef idx="0">
-            <a:schemeClr val="accent3"/>
-          </a:effectRef>
-          <a:fontRef idx="minor">
-            <a:schemeClr val="dk1"/>
-          </a:fontRef>
-        </p:style>
-        <p:txBody>
-          <a:bodyPr rtlCol="0" anchor="ctr"/>
-          <a:lstStyle/>
-          <a:p>
-            <a:pPr algn="ctr"/>
-            <a:endParaRPr lang="en-US"/>
-          </a:p>
-        </p:txBody>
-      </p:sp>
-      <p:sp>
-        <p:nvSpPr>
-          <p:cNvPr id="5" name="Round Diagonal Corner Rectangle 4"/>
-          <p:cNvSpPr/>
-          <p:nvPr/>
-        </p:nvSpPr>
-        <p:spPr>
-          <a:xfrm>
-            <a:off x="45026" y="2313700"/>
-            <a:ext cx="206087" cy="4461170"/>
-          </a:xfrm>
-          <a:prstGeom prst="round2DiagRect">
-            <a:avLst/>
-          </a:prstGeom>
-          <a:solidFill>
-            <a:srgbClr val="00B0F0"/>
-          </a:solidFill>
-          <a:ln>
-            <a:solidFill>
-              <a:srgbClr val="00B0F0"/>
-            </a:solidFill>
-          </a:ln>
-        </p:spPr>
-        <p:style>
-          <a:lnRef idx="2">
-            <a:schemeClr val="accent3"/>
-          </a:lnRef>
-          <a:fillRef idx="1">
-            <a:schemeClr val="lt1"/>
-          </a:fillRef>
-          <a:effectRef idx="0">
-            <a:schemeClr val="accent3"/>
-          </a:effectRef>
-          <a:fontRef idx="minor">
-            <a:schemeClr val="dk1"/>
-          </a:fontRef>
-        </p:style>
-        <p:txBody>
-          <a:bodyPr rtlCol="0" anchor="ctr"/>
-          <a:lstStyle/>
-          <a:p>
-            <a:pPr algn="ctr"/>
-            <a:endParaRPr lang="en-US"/>
-          </a:p>
-        </p:txBody>
-      </p:sp>
-      <p:sp>
-        <p:nvSpPr>
-          <p:cNvPr id="30" name="Content Placeholder 2"/>
-          <p:cNvSpPr txBox="1">
-            <a:spLocks/>
-          </p:cNvSpPr>
-          <p:nvPr/>
-        </p:nvSpPr>
-        <p:spPr>
-          <a:xfrm>
-            <a:off x="429658" y="980501"/>
-            <a:ext cx="8485742" cy="5648899"/>
-          </a:xfrm>
-          <a:prstGeom prst="rect">
-            <a:avLst/>
-          </a:prstGeom>
-        </p:spPr>
-        <p:txBody>
-          <a:bodyPr vert="horz" lIns="91440" tIns="45720" rIns="91440" bIns="45720" rtlCol="0">
-            <a:normAutofit/>
-          </a:bodyPr>
-          <a:lstStyle>
-            <a:lvl1pPr marL="0" indent="0" algn="ctr" defTabSz="914400" rtl="0" eaLnBrk="1" latinLnBrk="0" hangingPunct="1">
-              <a:spcBef>
-                <a:spcPct val="20000"/>
-              </a:spcBef>
-              <a:buFont typeface="Arial" panose="020B0604020202020204" pitchFamily="34" charset="0"/>
-              <a:buNone/>
-              <a:defRPr sz="3200" kern="1200">
-                <a:solidFill>
-                  <a:schemeClr val="tx1">
-                    <a:tint val="75000"/>
-                  </a:schemeClr>
-                </a:solidFill>
-                <a:latin typeface="+mn-lt"/>
-                <a:ea typeface="+mn-ea"/>
-                <a:cs typeface="+mn-cs"/>
-              </a:defRPr>
-            </a:lvl1pPr>
-            <a:lvl2pPr marL="457200" indent="0" algn="ctr" defTabSz="914400" rtl="0" eaLnBrk="1" latinLnBrk="0" hangingPunct="1">
-              <a:spcBef>
-                <a:spcPct val="20000"/>
-              </a:spcBef>
-              <a:buFont typeface="Arial" panose="020B0604020202020204" pitchFamily="34" charset="0"/>
-              <a:buNone/>
-              <a:defRPr sz="2800" kern="1200">
-                <a:solidFill>
-                  <a:schemeClr val="tx1">
-                    <a:tint val="75000"/>
-                  </a:schemeClr>
-                </a:solidFill>
-                <a:latin typeface="+mn-lt"/>
-                <a:ea typeface="+mn-ea"/>
-                <a:cs typeface="+mn-cs"/>
-              </a:defRPr>
-            </a:lvl2pPr>
-            <a:lvl3pPr marL="914400" indent="0" algn="ctr" defTabSz="914400" rtl="0" eaLnBrk="1" latinLnBrk="0" hangingPunct="1">
-              <a:spcBef>
-                <a:spcPct val="20000"/>
-              </a:spcBef>
-              <a:buFont typeface="Arial" panose="020B0604020202020204" pitchFamily="34" charset="0"/>
-              <a:buNone/>
-              <a:defRPr sz="2400" kern="1200">
-                <a:solidFill>
-                  <a:schemeClr val="tx1">
-                    <a:tint val="75000"/>
-                  </a:schemeClr>
-                </a:solidFill>
-                <a:latin typeface="+mn-lt"/>
-                <a:ea typeface="+mn-ea"/>
-                <a:cs typeface="+mn-cs"/>
-              </a:defRPr>
-            </a:lvl3pPr>
-            <a:lvl4pPr marL="1371600" indent="0" algn="ctr" defTabSz="914400" rtl="0" eaLnBrk="1" latinLnBrk="0" hangingPunct="1">
-              <a:spcBef>
-                <a:spcPct val="20000"/>
-              </a:spcBef>
-              <a:buFont typeface="Arial" panose="020B0604020202020204" pitchFamily="34" charset="0"/>
-              <a:buNone/>
-              <a:defRPr sz="2000" kern="1200">
-                <a:solidFill>
-                  <a:schemeClr val="tx1">
-                    <a:tint val="75000"/>
-                  </a:schemeClr>
-                </a:solidFill>
-                <a:latin typeface="+mn-lt"/>
-                <a:ea typeface="+mn-ea"/>
-                <a:cs typeface="+mn-cs"/>
-              </a:defRPr>
-            </a:lvl4pPr>
-            <a:lvl5pPr marL="1828800" indent="0" algn="ctr" defTabSz="914400" rtl="0" eaLnBrk="1" latinLnBrk="0" hangingPunct="1">
-              <a:spcBef>
-                <a:spcPct val="20000"/>
-              </a:spcBef>
-              <a:buFont typeface="Arial" panose="020B0604020202020204" pitchFamily="34" charset="0"/>
-              <a:buNone/>
-              <a:defRPr sz="2000" kern="1200">
-                <a:solidFill>
-                  <a:schemeClr val="tx1">
-                    <a:tint val="75000"/>
-                  </a:schemeClr>
-                </a:solidFill>
-                <a:latin typeface="+mn-lt"/>
-                <a:ea typeface="+mn-ea"/>
-                <a:cs typeface="+mn-cs"/>
-              </a:defRPr>
-            </a:lvl5pPr>
-            <a:lvl6pPr marL="2286000" indent="0" algn="ctr" defTabSz="914400" rtl="0" eaLnBrk="1" latinLnBrk="0" hangingPunct="1">
-              <a:spcBef>
-                <a:spcPct val="20000"/>
-              </a:spcBef>
-              <a:buFont typeface="Arial" panose="020B0604020202020204" pitchFamily="34" charset="0"/>
-              <a:buNone/>
-              <a:defRPr sz="2000" kern="1200">
-                <a:solidFill>
-                  <a:schemeClr val="tx1">
-                    <a:tint val="75000"/>
-                  </a:schemeClr>
-                </a:solidFill>
-                <a:latin typeface="+mn-lt"/>
-                <a:ea typeface="+mn-ea"/>
-                <a:cs typeface="+mn-cs"/>
-              </a:defRPr>
-            </a:lvl6pPr>
-            <a:lvl7pPr marL="2743200" indent="0" algn="ctr" defTabSz="914400" rtl="0" eaLnBrk="1" latinLnBrk="0" hangingPunct="1">
-              <a:spcBef>
-                <a:spcPct val="20000"/>
-              </a:spcBef>
-              <a:buFont typeface="Arial" panose="020B0604020202020204" pitchFamily="34" charset="0"/>
-              <a:buNone/>
-              <a:defRPr sz="2000" kern="1200">
-                <a:solidFill>
-                  <a:schemeClr val="tx1">
-                    <a:tint val="75000"/>
-                  </a:schemeClr>
-                </a:solidFill>
-                <a:latin typeface="+mn-lt"/>
-                <a:ea typeface="+mn-ea"/>
-                <a:cs typeface="+mn-cs"/>
-              </a:defRPr>
-            </a:lvl7pPr>
-            <a:lvl8pPr marL="3200400" indent="0" algn="ctr" defTabSz="914400" rtl="0" eaLnBrk="1" latinLnBrk="0" hangingPunct="1">
-              <a:spcBef>
-                <a:spcPct val="20000"/>
-              </a:spcBef>
-              <a:buFont typeface="Arial" panose="020B0604020202020204" pitchFamily="34" charset="0"/>
-              <a:buNone/>
-              <a:defRPr sz="2000" kern="1200">
-                <a:solidFill>
-                  <a:schemeClr val="tx1">
-                    <a:tint val="75000"/>
-                  </a:schemeClr>
-                </a:solidFill>
-                <a:latin typeface="+mn-lt"/>
-                <a:ea typeface="+mn-ea"/>
-                <a:cs typeface="+mn-cs"/>
-              </a:defRPr>
-            </a:lvl8pPr>
-            <a:lvl9pPr marL="3657600" indent="0" algn="ctr" defTabSz="914400" rtl="0" eaLnBrk="1" latinLnBrk="0" hangingPunct="1">
-              <a:spcBef>
-                <a:spcPct val="20000"/>
-              </a:spcBef>
-              <a:buFont typeface="Arial" panose="020B0604020202020204" pitchFamily="34" charset="0"/>
-              <a:buNone/>
-              <a:defRPr sz="2000" kern="1200">
-                <a:solidFill>
-                  <a:schemeClr val="tx1">
-                    <a:tint val="75000"/>
-                  </a:schemeClr>
-                </a:solidFill>
-                <a:latin typeface="+mn-lt"/>
-                <a:ea typeface="+mn-ea"/>
-                <a:cs typeface="+mn-cs"/>
-              </a:defRPr>
-            </a:lvl9pPr>
-          </a:lstStyle>
-          <a:p>
-            <a:pPr marL="342900" indent="-342900" algn="l">
-              <a:buFont typeface="Wingdings" panose="05000000000000000000" pitchFamily="2" charset="2"/>
-              <a:buChar char="Ø"/>
-            </a:pPr>
-            <a:r>
-              <a:rPr lang="en-IN" sz="2400" dirty="0">
-                <a:solidFill>
-                  <a:srgbClr val="0055A0"/>
-                </a:solidFill>
-              </a:rPr>
-              <a:t>The objective of this project is to predict whether the customer will default their ﬁrst EMI on the Vehicle Loan on due date or not using the Loan Default Prediction Dataset from Kaggle.</a:t>
-            </a:r>
-          </a:p>
-          <a:p>
-            <a:pPr marL="342900" indent="-342900" algn="l">
-              <a:buFont typeface="Wingdings" panose="05000000000000000000" pitchFamily="2" charset="2"/>
-              <a:buChar char="Ø"/>
-            </a:pPr>
-            <a:r>
-              <a:rPr lang="en-US" sz="2400" dirty="0">
-                <a:solidFill>
-                  <a:srgbClr val="0055A0"/>
-                </a:solidFill>
-              </a:rPr>
-              <a:t>Finding out the critical features that to help him/the company to evaluating the probability of default of the customer, as well as prevent loosing out potential customers otherwise lost.</a:t>
-            </a:r>
           </a:p>
           <a:p>
             <a:pPr marL="342900" indent="-342900" algn="l">
@@ -4573,217 +4457,6 @@
     <p:extLst>
       <p:ext uri="{BB962C8B-B14F-4D97-AF65-F5344CB8AC3E}">
         <p14:creationId xmlns:p14="http://schemas.microsoft.com/office/powerpoint/2010/main" val="3761210359"/>
-      </p:ext>
-    </p:extLst>
-  </p:cSld>
-  <p:clrMapOvr>
-    <a:masterClrMapping/>
-  </p:clrMapOvr>
-  <p:timing>
-    <p:tnLst>
-      <p:par>
-        <p:cTn id="1" dur="indefinite" restart="never" nodeType="tmRoot">
-          <p:childTnLst>
-            <p:seq concurrent="1" nextAc="seek">
-              <p:cTn id="2" dur="indefinite" nodeType="mainSeq">
-                <p:childTnLst>
-                  <p:par>
-                    <p:cTn id="3" fill="hold">
-                      <p:stCondLst>
-                        <p:cond delay="indefinite"/>
-                      </p:stCondLst>
-                      <p:childTnLst>
-                        <p:par>
-                          <p:cTn id="4" fill="hold">
-                            <p:stCondLst>
-                              <p:cond delay="0"/>
-                            </p:stCondLst>
-                            <p:childTnLst>
-                              <p:par>
-                                <p:cTn id="5" presetID="1" presetClass="entr" presetSubtype="0" fill="hold" nodeType="clickEffect">
-                                  <p:stCondLst>
-                                    <p:cond delay="0"/>
-                                  </p:stCondLst>
-                                  <p:childTnLst>
-                                    <p:set>
-                                      <p:cBhvr>
-                                        <p:cTn id="6" dur="1" fill="hold">
-                                          <p:stCondLst>
-                                            <p:cond delay="0"/>
-                                          </p:stCondLst>
-                                        </p:cTn>
-                                        <p:tgtEl>
-                                          <p:spTgt spid="30">
-                                            <p:txEl>
-                                              <p:pRg st="0" end="0"/>
-                                            </p:txEl>
-                                          </p:spTgt>
-                                        </p:tgtEl>
-                                        <p:attrNameLst>
-                                          <p:attrName>style.visibility</p:attrName>
-                                        </p:attrNameLst>
-                                      </p:cBhvr>
-                                      <p:to>
-                                        <p:strVal val="visible"/>
-                                      </p:to>
-                                    </p:set>
-                                  </p:childTnLst>
-                                </p:cTn>
-                              </p:par>
-                            </p:childTnLst>
-                          </p:cTn>
-                        </p:par>
-                      </p:childTnLst>
-                    </p:cTn>
-                  </p:par>
-                  <p:par>
-                    <p:cTn id="7" fill="hold">
-                      <p:stCondLst>
-                        <p:cond delay="indefinite"/>
-                      </p:stCondLst>
-                      <p:childTnLst>
-                        <p:par>
-                          <p:cTn id="8" fill="hold">
-                            <p:stCondLst>
-                              <p:cond delay="0"/>
-                            </p:stCondLst>
-                            <p:childTnLst>
-                              <p:par>
-                                <p:cTn id="9" presetID="1" presetClass="entr" presetSubtype="0" fill="hold" nodeType="clickEffect">
-                                  <p:stCondLst>
-                                    <p:cond delay="0"/>
-                                  </p:stCondLst>
-                                  <p:childTnLst>
-                                    <p:set>
-                                      <p:cBhvr>
-                                        <p:cTn id="10" dur="1" fill="hold">
-                                          <p:stCondLst>
-                                            <p:cond delay="0"/>
-                                          </p:stCondLst>
-                                        </p:cTn>
-                                        <p:tgtEl>
-                                          <p:spTgt spid="30">
-                                            <p:txEl>
-                                              <p:pRg st="1" end="1"/>
-                                            </p:txEl>
-                                          </p:spTgt>
-                                        </p:tgtEl>
-                                        <p:attrNameLst>
-                                          <p:attrName>style.visibility</p:attrName>
-                                        </p:attrNameLst>
-                                      </p:cBhvr>
-                                      <p:to>
-                                        <p:strVal val="visible"/>
-                                      </p:to>
-                                    </p:set>
-                                  </p:childTnLst>
-                                </p:cTn>
-                              </p:par>
-                            </p:childTnLst>
-                          </p:cTn>
-                        </p:par>
-                      </p:childTnLst>
-                    </p:cTn>
-                  </p:par>
-                </p:childTnLst>
-              </p:cTn>
-              <p:prevCondLst>
-                <p:cond evt="onPrev" delay="0">
-                  <p:tgtEl>
-                    <p:sldTgt/>
-                  </p:tgtEl>
-                </p:cond>
-              </p:prevCondLst>
-              <p:nextCondLst>
-                <p:cond evt="onNext" delay="0">
-                  <p:tgtEl>
-                    <p:sldTgt/>
-                  </p:tgtEl>
-                </p:cond>
-              </p:nextCondLst>
-            </p:seq>
-          </p:childTnLst>
-        </p:cTn>
-      </p:par>
-    </p:tnLst>
-  </p:timing>
-</p:sld>
-</file>
-
-<file path=ppt/slides/slide3.xml><?xml version="1.0" encoding="utf-8"?>
-<p:sld xmlns:a="http://schemas.openxmlformats.org/drawingml/2006/main" xmlns:r="http://schemas.openxmlformats.org/officeDocument/2006/relationships" xmlns:p="http://schemas.openxmlformats.org/presentationml/2006/main">
-  <p:cSld>
-    <p:spTree>
-      <p:nvGrpSpPr>
-        <p:cNvPr id="1" name=""/>
-        <p:cNvGrpSpPr/>
-        <p:nvPr/>
-      </p:nvGrpSpPr>
-      <p:grpSpPr>
-        <a:xfrm>
-          <a:off x="0" y="0"/>
-          <a:ext cx="0" cy="0"/>
-          <a:chOff x="0" y="0"/>
-          <a:chExt cx="0" cy="0"/>
-        </a:xfrm>
-      </p:grpSpPr>
-      <p:sp>
-        <p:nvSpPr>
-          <p:cNvPr id="2" name="Title 1">
-            <a:extLst>
-              <a:ext uri="{FF2B5EF4-FFF2-40B4-BE49-F238E27FC236}">
-                <a16:creationId xmlns:a16="http://schemas.microsoft.com/office/drawing/2014/main" id="{543925F3-AEA9-4425-BE85-A907329B807D}"/>
-              </a:ext>
-            </a:extLst>
-          </p:cNvPr>
-          <p:cNvSpPr>
-            <a:spLocks noGrp="1"/>
-          </p:cNvSpPr>
-          <p:nvPr>
-            <p:ph type="title"/>
-          </p:nvPr>
-        </p:nvSpPr>
-        <p:spPr/>
-        <p:txBody>
-          <a:bodyPr/>
-          <a:lstStyle/>
-          <a:p>
-            <a:r>
-              <a:rPr lang="en-US" dirty="0"/>
-              <a:t>Introduction</a:t>
-            </a:r>
-          </a:p>
-        </p:txBody>
-      </p:sp>
-      <p:sp>
-        <p:nvSpPr>
-          <p:cNvPr id="3" name="Content Placeholder 2">
-            <a:extLst>
-              <a:ext uri="{FF2B5EF4-FFF2-40B4-BE49-F238E27FC236}">
-                <a16:creationId xmlns:a16="http://schemas.microsoft.com/office/drawing/2014/main" id="{58171DD3-3E42-48DF-95D4-3408C189D523}"/>
-              </a:ext>
-            </a:extLst>
-          </p:cNvPr>
-          <p:cNvSpPr>
-            <a:spLocks noGrp="1"/>
-          </p:cNvSpPr>
-          <p:nvPr>
-            <p:ph idx="1"/>
-          </p:nvPr>
-        </p:nvSpPr>
-        <p:spPr/>
-        <p:txBody>
-          <a:bodyPr/>
-          <a:lstStyle/>
-          <a:p>
-            <a:endParaRPr lang="en-US" dirty="0"/>
-          </a:p>
-        </p:txBody>
-      </p:sp>
-    </p:spTree>
-    <p:extLst>
-      <p:ext uri="{BB962C8B-B14F-4D97-AF65-F5344CB8AC3E}">
-        <p14:creationId xmlns:p14="http://schemas.microsoft.com/office/powerpoint/2010/main" val="3561413167"/>
       </p:ext>
     </p:extLst>
   </p:cSld>
@@ -4812,661 +4485,190 @@
       </p:grpSpPr>
       <p:sp>
         <p:nvSpPr>
-          <p:cNvPr id="4" name="Round Diagonal Corner Rectangle 3"/>
-          <p:cNvSpPr/>
-          <p:nvPr/>
+          <p:cNvPr id="2" name="Title 1"/>
+          <p:cNvSpPr>
+            <a:spLocks noGrp="1"/>
+          </p:cNvSpPr>
+          <p:nvPr>
+            <p:ph type="title"/>
+          </p:nvPr>
         </p:nvSpPr>
         <p:spPr>
           <a:xfrm>
-            <a:off x="45026" y="58880"/>
-            <a:ext cx="206087" cy="2209800"/>
+            <a:off x="628650" y="457200"/>
+            <a:ext cx="7886700" cy="1590571"/>
           </a:xfrm>
-          <a:prstGeom prst="round2DiagRect">
-            <a:avLst/>
-          </a:prstGeom>
-          <a:solidFill>
-            <a:srgbClr val="0070C0"/>
-          </a:solidFill>
-          <a:ln>
-            <a:solidFill>
-              <a:srgbClr val="0070C0"/>
-            </a:solidFill>
-          </a:ln>
         </p:spPr>
-        <p:style>
-          <a:lnRef idx="2">
-            <a:schemeClr val="accent3"/>
-          </a:lnRef>
-          <a:fillRef idx="1">
-            <a:schemeClr val="lt1"/>
-          </a:fillRef>
-          <a:effectRef idx="0">
-            <a:schemeClr val="accent3"/>
-          </a:effectRef>
-          <a:fontRef idx="minor">
-            <a:schemeClr val="dk1"/>
-          </a:fontRef>
-        </p:style>
-        <p:txBody>
-          <a:bodyPr rtlCol="0" anchor="ctr"/>
-          <a:lstStyle/>
-          <a:p>
-            <a:pPr algn="ctr"/>
-            <a:endParaRPr lang="en-US"/>
-          </a:p>
-        </p:txBody>
-      </p:sp>
-      <p:sp>
-        <p:nvSpPr>
-          <p:cNvPr id="5" name="Round Diagonal Corner Rectangle 4"/>
-          <p:cNvSpPr/>
+        <p:txBody>
+          <a:bodyPr>
+            <a:normAutofit/>
+          </a:bodyPr>
+          <a:lstStyle/>
+          <a:p>
+            <a:pPr algn="l"/>
+            <a:r>
+              <a:rPr lang="en-IN" sz="1650" b="1" dirty="0">
+                <a:latin typeface="Arial Rounded MT Bold" panose="020F0704030504030204" pitchFamily="34" charset="0"/>
+              </a:rPr>
+              <a:t>Distribution plot on numerical features:</a:t>
+            </a:r>
+            <a:br>
+              <a:rPr lang="en-IN" sz="1650" b="1" dirty="0">
+                <a:latin typeface="Arial Rounded MT Bold" panose="020F0704030504030204" pitchFamily="34" charset="0"/>
+              </a:rPr>
+            </a:br>
+            <a:r>
+              <a:rPr lang="en-IN" sz="1400" dirty="0">
+                <a:latin typeface="+mn-lt"/>
+              </a:rPr>
+              <a:t>Here numerical features are used for distribution plot. Most of the numerical variable like Asset cost distribution, primary CB, disbursed amount follows right skewed distribution whereas LTV follows left skewed distribution. Because in case if the borrower defaults on the loan</a:t>
+            </a:r>
+            <a:br>
+              <a:rPr lang="en-IN" sz="1400" dirty="0">
+                <a:latin typeface="+mn-lt"/>
+              </a:rPr>
+            </a:br>
+            <a:r>
+              <a:rPr lang="en-IN" sz="1400" dirty="0">
+                <a:latin typeface="+mn-lt"/>
+              </a:rPr>
+              <a:t>the lender can reposes the collateral and collect the money by selling it off. They can recover the losses for defaulted loan.</a:t>
+            </a:r>
+            <a:endParaRPr lang="en-IN" sz="1400" dirty="0">
+              <a:latin typeface="Arial Rounded MT Bold" panose="020F0704030504030204" pitchFamily="34" charset="0"/>
+            </a:endParaRPr>
+          </a:p>
+        </p:txBody>
+      </p:sp>
+      <p:pic>
+        <p:nvPicPr>
+          <p:cNvPr id="7" name="Picture 6"/>
+          <p:cNvPicPr>
+            <a:picLocks noChangeAspect="1"/>
+          </p:cNvPicPr>
           <p:nvPr/>
-        </p:nvSpPr>
+        </p:nvPicPr>
+        <p:blipFill>
+          <a:blip r:embed="rId2">
+            <a:extLst>
+              <a:ext uri="{28A0092B-C50C-407E-A947-70E740481C1C}">
+                <a14:useLocalDpi xmlns:a14="http://schemas.microsoft.com/office/drawing/2010/main" val="0"/>
+              </a:ext>
+            </a:extLst>
+          </a:blip>
+          <a:stretch>
+            <a:fillRect/>
+          </a:stretch>
+        </p:blipFill>
         <p:spPr>
           <a:xfrm>
-            <a:off x="45026" y="2313700"/>
-            <a:ext cx="206087" cy="4461170"/>
-          </a:xfrm>
-          <a:prstGeom prst="round2DiagRect">
-            <a:avLst/>
-          </a:prstGeom>
-          <a:solidFill>
-            <a:srgbClr val="00B0F0"/>
-          </a:solidFill>
-          <a:ln>
-            <a:solidFill>
-              <a:srgbClr val="00B0F0"/>
-            </a:solidFill>
-          </a:ln>
-        </p:spPr>
-        <p:style>
-          <a:lnRef idx="2">
-            <a:schemeClr val="accent3"/>
-          </a:lnRef>
-          <a:fillRef idx="1">
-            <a:schemeClr val="lt1"/>
-          </a:fillRef>
-          <a:effectRef idx="0">
-            <a:schemeClr val="accent3"/>
-          </a:effectRef>
-          <a:fontRef idx="minor">
-            <a:schemeClr val="dk1"/>
-          </a:fontRef>
-        </p:style>
-        <p:txBody>
-          <a:bodyPr rtlCol="0" anchor="ctr"/>
-          <a:lstStyle/>
-          <a:p>
-            <a:pPr algn="ctr"/>
-            <a:endParaRPr lang="en-US"/>
-          </a:p>
-        </p:txBody>
-      </p:sp>
-      <p:sp>
-        <p:nvSpPr>
-          <p:cNvPr id="30" name="Content Placeholder 2"/>
-          <p:cNvSpPr txBox="1">
-            <a:spLocks/>
-          </p:cNvSpPr>
-          <p:nvPr/>
-        </p:nvSpPr>
-        <p:spPr>
-          <a:xfrm>
-            <a:off x="429658" y="980501"/>
-            <a:ext cx="8485742" cy="5648899"/>
+            <a:off x="484153" y="2103087"/>
+            <a:ext cx="3729706" cy="2366615"/>
           </a:xfrm>
           <a:prstGeom prst="rect">
             <a:avLst/>
           </a:prstGeom>
         </p:spPr>
-        <p:txBody>
-          <a:bodyPr vert="horz" lIns="91440" tIns="45720" rIns="91440" bIns="45720" rtlCol="0">
-            <a:normAutofit/>
-          </a:bodyPr>
-          <a:lstStyle>
-            <a:lvl1pPr marL="0" indent="0" algn="ctr" defTabSz="914400" rtl="0" eaLnBrk="1" latinLnBrk="0" hangingPunct="1">
-              <a:spcBef>
-                <a:spcPct val="20000"/>
-              </a:spcBef>
-              <a:buFont typeface="Arial" panose="020B0604020202020204" pitchFamily="34" charset="0"/>
-              <a:buNone/>
-              <a:defRPr sz="3200" kern="1200">
-                <a:solidFill>
-                  <a:schemeClr val="tx1">
-                    <a:tint val="75000"/>
-                  </a:schemeClr>
-                </a:solidFill>
-                <a:latin typeface="+mn-lt"/>
-                <a:ea typeface="+mn-ea"/>
-                <a:cs typeface="+mn-cs"/>
-              </a:defRPr>
-            </a:lvl1pPr>
-            <a:lvl2pPr marL="457200" indent="0" algn="ctr" defTabSz="914400" rtl="0" eaLnBrk="1" latinLnBrk="0" hangingPunct="1">
-              <a:spcBef>
-                <a:spcPct val="20000"/>
-              </a:spcBef>
-              <a:buFont typeface="Arial" panose="020B0604020202020204" pitchFamily="34" charset="0"/>
-              <a:buNone/>
-              <a:defRPr sz="2800" kern="1200">
-                <a:solidFill>
-                  <a:schemeClr val="tx1">
-                    <a:tint val="75000"/>
-                  </a:schemeClr>
-                </a:solidFill>
-                <a:latin typeface="+mn-lt"/>
-                <a:ea typeface="+mn-ea"/>
-                <a:cs typeface="+mn-cs"/>
-              </a:defRPr>
-            </a:lvl2pPr>
-            <a:lvl3pPr marL="914400" indent="0" algn="ctr" defTabSz="914400" rtl="0" eaLnBrk="1" latinLnBrk="0" hangingPunct="1">
-              <a:spcBef>
-                <a:spcPct val="20000"/>
-              </a:spcBef>
-              <a:buFont typeface="Arial" panose="020B0604020202020204" pitchFamily="34" charset="0"/>
-              <a:buNone/>
-              <a:defRPr sz="2400" kern="1200">
-                <a:solidFill>
-                  <a:schemeClr val="tx1">
-                    <a:tint val="75000"/>
-                  </a:schemeClr>
-                </a:solidFill>
-                <a:latin typeface="+mn-lt"/>
-                <a:ea typeface="+mn-ea"/>
-                <a:cs typeface="+mn-cs"/>
-              </a:defRPr>
-            </a:lvl3pPr>
-            <a:lvl4pPr marL="1371600" indent="0" algn="ctr" defTabSz="914400" rtl="0" eaLnBrk="1" latinLnBrk="0" hangingPunct="1">
-              <a:spcBef>
-                <a:spcPct val="20000"/>
-              </a:spcBef>
-              <a:buFont typeface="Arial" panose="020B0604020202020204" pitchFamily="34" charset="0"/>
-              <a:buNone/>
-              <a:defRPr sz="2000" kern="1200">
-                <a:solidFill>
-                  <a:schemeClr val="tx1">
-                    <a:tint val="75000"/>
-                  </a:schemeClr>
-                </a:solidFill>
-                <a:latin typeface="+mn-lt"/>
-                <a:ea typeface="+mn-ea"/>
-                <a:cs typeface="+mn-cs"/>
-              </a:defRPr>
-            </a:lvl4pPr>
-            <a:lvl5pPr marL="1828800" indent="0" algn="ctr" defTabSz="914400" rtl="0" eaLnBrk="1" latinLnBrk="0" hangingPunct="1">
-              <a:spcBef>
-                <a:spcPct val="20000"/>
-              </a:spcBef>
-              <a:buFont typeface="Arial" panose="020B0604020202020204" pitchFamily="34" charset="0"/>
-              <a:buNone/>
-              <a:defRPr sz="2000" kern="1200">
-                <a:solidFill>
-                  <a:schemeClr val="tx1">
-                    <a:tint val="75000"/>
-                  </a:schemeClr>
-                </a:solidFill>
-                <a:latin typeface="+mn-lt"/>
-                <a:ea typeface="+mn-ea"/>
-                <a:cs typeface="+mn-cs"/>
-              </a:defRPr>
-            </a:lvl5pPr>
-            <a:lvl6pPr marL="2286000" indent="0" algn="ctr" defTabSz="914400" rtl="0" eaLnBrk="1" latinLnBrk="0" hangingPunct="1">
-              <a:spcBef>
-                <a:spcPct val="20000"/>
-              </a:spcBef>
-              <a:buFont typeface="Arial" panose="020B0604020202020204" pitchFamily="34" charset="0"/>
-              <a:buNone/>
-              <a:defRPr sz="2000" kern="1200">
-                <a:solidFill>
-                  <a:schemeClr val="tx1">
-                    <a:tint val="75000"/>
-                  </a:schemeClr>
-                </a:solidFill>
-                <a:latin typeface="+mn-lt"/>
-                <a:ea typeface="+mn-ea"/>
-                <a:cs typeface="+mn-cs"/>
-              </a:defRPr>
-            </a:lvl6pPr>
-            <a:lvl7pPr marL="2743200" indent="0" algn="ctr" defTabSz="914400" rtl="0" eaLnBrk="1" latinLnBrk="0" hangingPunct="1">
-              <a:spcBef>
-                <a:spcPct val="20000"/>
-              </a:spcBef>
-              <a:buFont typeface="Arial" panose="020B0604020202020204" pitchFamily="34" charset="0"/>
-              <a:buNone/>
-              <a:defRPr sz="2000" kern="1200">
-                <a:solidFill>
-                  <a:schemeClr val="tx1">
-                    <a:tint val="75000"/>
-                  </a:schemeClr>
-                </a:solidFill>
-                <a:latin typeface="+mn-lt"/>
-                <a:ea typeface="+mn-ea"/>
-                <a:cs typeface="+mn-cs"/>
-              </a:defRPr>
-            </a:lvl7pPr>
-            <a:lvl8pPr marL="3200400" indent="0" algn="ctr" defTabSz="914400" rtl="0" eaLnBrk="1" latinLnBrk="0" hangingPunct="1">
-              <a:spcBef>
-                <a:spcPct val="20000"/>
-              </a:spcBef>
-              <a:buFont typeface="Arial" panose="020B0604020202020204" pitchFamily="34" charset="0"/>
-              <a:buNone/>
-              <a:defRPr sz="2000" kern="1200">
-                <a:solidFill>
-                  <a:schemeClr val="tx1">
-                    <a:tint val="75000"/>
-                  </a:schemeClr>
-                </a:solidFill>
-                <a:latin typeface="+mn-lt"/>
-                <a:ea typeface="+mn-ea"/>
-                <a:cs typeface="+mn-cs"/>
-              </a:defRPr>
-            </a:lvl8pPr>
-            <a:lvl9pPr marL="3657600" indent="0" algn="ctr" defTabSz="914400" rtl="0" eaLnBrk="1" latinLnBrk="0" hangingPunct="1">
-              <a:spcBef>
-                <a:spcPct val="20000"/>
-              </a:spcBef>
-              <a:buFont typeface="Arial" panose="020B0604020202020204" pitchFamily="34" charset="0"/>
-              <a:buNone/>
-              <a:defRPr sz="2000" kern="1200">
-                <a:solidFill>
-                  <a:schemeClr val="tx1">
-                    <a:tint val="75000"/>
-                  </a:schemeClr>
-                </a:solidFill>
-                <a:latin typeface="+mn-lt"/>
-                <a:ea typeface="+mn-ea"/>
-                <a:cs typeface="+mn-cs"/>
-              </a:defRPr>
-            </a:lvl9pPr>
-          </a:lstStyle>
-          <a:p>
-            <a:pPr marL="342900" indent="-342900" algn="l">
-              <a:buFont typeface="Wingdings" panose="05000000000000000000" pitchFamily="2" charset="2"/>
-              <a:buChar char="Ø"/>
-            </a:pPr>
-            <a:r>
-              <a:rPr lang="en-IN" sz="2400" dirty="0">
-                <a:solidFill>
-                  <a:srgbClr val="0055A0"/>
-                </a:solidFill>
-              </a:rPr>
-              <a:t>Suggested solution for the defined problem</a:t>
-            </a:r>
-          </a:p>
-          <a:p>
-            <a:pPr marL="342900" indent="-342900" algn="l">
-              <a:buFont typeface="Wingdings" panose="05000000000000000000" pitchFamily="2" charset="2"/>
-              <a:buChar char="Ø"/>
-            </a:pPr>
-            <a:r>
-              <a:rPr lang="en-IN" sz="2400" dirty="0">
-                <a:solidFill>
-                  <a:srgbClr val="0055A0"/>
-                </a:solidFill>
-              </a:rPr>
-              <a:t>Data sets considered</a:t>
-            </a:r>
-          </a:p>
-          <a:p>
-            <a:pPr marL="342900" indent="-342900" algn="l">
-              <a:buFont typeface="Wingdings" panose="05000000000000000000" pitchFamily="2" charset="2"/>
-              <a:buChar char="Ø"/>
-            </a:pPr>
-            <a:r>
-              <a:rPr lang="en-IN" sz="2400" dirty="0">
-                <a:solidFill>
-                  <a:srgbClr val="0055A0"/>
-                </a:solidFill>
-              </a:rPr>
-              <a:t>Exploratory data analytics done</a:t>
-            </a:r>
-          </a:p>
-          <a:p>
-            <a:pPr marL="342900" indent="-342900" algn="l">
-              <a:buFont typeface="Wingdings" panose="05000000000000000000" pitchFamily="2" charset="2"/>
-              <a:buChar char="Ø"/>
-            </a:pPr>
-            <a:r>
-              <a:rPr lang="en-IN" sz="2400" dirty="0">
-                <a:solidFill>
-                  <a:srgbClr val="0055A0"/>
-                </a:solidFill>
-              </a:rPr>
-              <a:t>Any challenges expected/addressed</a:t>
-            </a:r>
-          </a:p>
-          <a:p>
-            <a:pPr marL="342900" indent="-342900" algn="l">
-              <a:buFont typeface="Wingdings" panose="05000000000000000000" pitchFamily="2" charset="2"/>
-              <a:buChar char="Ø"/>
-            </a:pPr>
-            <a:r>
-              <a:rPr lang="en-IN" sz="2400" dirty="0">
-                <a:solidFill>
-                  <a:srgbClr val="0055A0"/>
-                </a:solidFill>
-              </a:rPr>
-              <a:t>Tentative time: 6-8 minutes</a:t>
-            </a:r>
-          </a:p>
-        </p:txBody>
-      </p:sp>
-      <p:sp>
-        <p:nvSpPr>
-          <p:cNvPr id="31" name="TextBox 30"/>
-          <p:cNvSpPr txBox="1"/>
+      </p:pic>
+      <p:pic>
+        <p:nvPicPr>
+          <p:cNvPr id="8" name="Picture 7"/>
+          <p:cNvPicPr>
+            <a:picLocks noChangeAspect="1"/>
+          </p:cNvPicPr>
           <p:nvPr/>
-        </p:nvSpPr>
+        </p:nvPicPr>
+        <p:blipFill>
+          <a:blip r:embed="rId3">
+            <a:extLst>
+              <a:ext uri="{28A0092B-C50C-407E-A947-70E740481C1C}">
+                <a14:useLocalDpi xmlns:a14="http://schemas.microsoft.com/office/drawing/2010/main" val="0"/>
+              </a:ext>
+            </a:extLst>
+          </a:blip>
+          <a:stretch>
+            <a:fillRect/>
+          </a:stretch>
+        </p:blipFill>
         <p:spPr>
           <a:xfrm>
-            <a:off x="454231" y="54114"/>
-            <a:ext cx="8537369" cy="707886"/>
+            <a:off x="4973274" y="2208503"/>
+            <a:ext cx="3686573" cy="2155782"/>
           </a:xfrm>
           <a:prstGeom prst="rect">
             <a:avLst/>
           </a:prstGeom>
-          <a:noFill/>
         </p:spPr>
-        <p:txBody>
-          <a:bodyPr wrap="square" rtlCol="0">
-            <a:spAutoFit/>
-          </a:bodyPr>
-          <a:lstStyle/>
-          <a:p>
-            <a:r>
-              <a:rPr lang="en-US" sz="4000">
-                <a:ea typeface="굴림" panose="020B0600000101010101" pitchFamily="34" charset="-127"/>
-              </a:rPr>
-              <a:t>Suggested Solution and EDA</a:t>
-            </a:r>
-            <a:endParaRPr lang="en-US" sz="4000" b="1" dirty="0"/>
-          </a:p>
-        </p:txBody>
-      </p:sp>
+      </p:pic>
+      <p:pic>
+        <p:nvPicPr>
+          <p:cNvPr id="10" name="Content Placeholder 9"/>
+          <p:cNvPicPr>
+            <a:picLocks noGrp="1" noChangeAspect="1"/>
+          </p:cNvPicPr>
+          <p:nvPr>
+            <p:ph idx="1"/>
+          </p:nvPr>
+        </p:nvPicPr>
+        <p:blipFill>
+          <a:blip r:embed="rId4">
+            <a:extLst>
+              <a:ext uri="{28A0092B-C50C-407E-A947-70E740481C1C}">
+                <a14:useLocalDpi xmlns:a14="http://schemas.microsoft.com/office/drawing/2010/main" val="0"/>
+              </a:ext>
+            </a:extLst>
+          </a:blip>
+          <a:stretch>
+            <a:fillRect/>
+          </a:stretch>
+        </p:blipFill>
+        <p:spPr>
+          <a:xfrm>
+            <a:off x="4891177" y="4419600"/>
+            <a:ext cx="3752959" cy="2155782"/>
+          </a:xfrm>
+        </p:spPr>
+      </p:pic>
+      <p:pic>
+        <p:nvPicPr>
+          <p:cNvPr id="11" name="Picture 10"/>
+          <p:cNvPicPr>
+            <a:picLocks noChangeAspect="1"/>
+          </p:cNvPicPr>
+          <p:nvPr/>
+        </p:nvPicPr>
+        <p:blipFill>
+          <a:blip r:embed="rId5">
+            <a:extLst>
+              <a:ext uri="{28A0092B-C50C-407E-A947-70E740481C1C}">
+                <a14:useLocalDpi xmlns:a14="http://schemas.microsoft.com/office/drawing/2010/main" val="0"/>
+              </a:ext>
+            </a:extLst>
+          </a:blip>
+          <a:stretch>
+            <a:fillRect/>
+          </a:stretch>
+        </p:blipFill>
+        <p:spPr>
+          <a:xfrm>
+            <a:off x="499864" y="4503481"/>
+            <a:ext cx="3762899" cy="2086827"/>
+          </a:xfrm>
+          <a:prstGeom prst="rect">
+            <a:avLst/>
+          </a:prstGeom>
+        </p:spPr>
+      </p:pic>
     </p:spTree>
     <p:extLst>
       <p:ext uri="{BB962C8B-B14F-4D97-AF65-F5344CB8AC3E}">
-        <p14:creationId xmlns:p14="http://schemas.microsoft.com/office/powerpoint/2010/main" val="1152539440"/>
+        <p14:creationId xmlns:p14="http://schemas.microsoft.com/office/powerpoint/2010/main" val="3383383383"/>
       </p:ext>
     </p:extLst>
   </p:cSld>
   <p:clrMapOvr>
     <a:masterClrMapping/>
   </p:clrMapOvr>
-  <p:timing>
-    <p:tnLst>
-      <p:par>
-        <p:cTn id="1" dur="indefinite" restart="never" nodeType="tmRoot">
-          <p:childTnLst>
-            <p:seq concurrent="1" nextAc="seek">
-              <p:cTn id="2" dur="indefinite" nodeType="mainSeq">
-                <p:childTnLst>
-                  <p:par>
-                    <p:cTn id="3" fill="hold">
-                      <p:stCondLst>
-                        <p:cond delay="indefinite"/>
-                      </p:stCondLst>
-                      <p:childTnLst>
-                        <p:par>
-                          <p:cTn id="4" fill="hold">
-                            <p:stCondLst>
-                              <p:cond delay="0"/>
-                            </p:stCondLst>
-                            <p:childTnLst>
-                              <p:par>
-                                <p:cTn id="5" presetID="1" presetClass="entr" presetSubtype="0" fill="hold" nodeType="clickEffect">
-                                  <p:stCondLst>
-                                    <p:cond delay="0"/>
-                                  </p:stCondLst>
-                                  <p:childTnLst>
-                                    <p:set>
-                                      <p:cBhvr>
-                                        <p:cTn id="6" dur="1" fill="hold">
-                                          <p:stCondLst>
-                                            <p:cond delay="0"/>
-                                          </p:stCondLst>
-                                        </p:cTn>
-                                        <p:tgtEl>
-                                          <p:spTgt spid="30">
-                                            <p:txEl>
-                                              <p:pRg st="0" end="0"/>
-                                            </p:txEl>
-                                          </p:spTgt>
-                                        </p:tgtEl>
-                                        <p:attrNameLst>
-                                          <p:attrName>style.visibility</p:attrName>
-                                        </p:attrNameLst>
-                                      </p:cBhvr>
-                                      <p:to>
-                                        <p:strVal val="visible"/>
-                                      </p:to>
-                                    </p:set>
-                                  </p:childTnLst>
-                                </p:cTn>
-                              </p:par>
-                            </p:childTnLst>
-                          </p:cTn>
-                        </p:par>
-                      </p:childTnLst>
-                    </p:cTn>
-                  </p:par>
-                  <p:par>
-                    <p:cTn id="7" fill="hold">
-                      <p:stCondLst>
-                        <p:cond delay="indefinite"/>
-                      </p:stCondLst>
-                      <p:childTnLst>
-                        <p:par>
-                          <p:cTn id="8" fill="hold">
-                            <p:stCondLst>
-                              <p:cond delay="0"/>
-                            </p:stCondLst>
-                            <p:childTnLst>
-                              <p:par>
-                                <p:cTn id="9" presetID="1" presetClass="entr" presetSubtype="0" fill="hold" nodeType="clickEffect">
-                                  <p:stCondLst>
-                                    <p:cond delay="0"/>
-                                  </p:stCondLst>
-                                  <p:childTnLst>
-                                    <p:set>
-                                      <p:cBhvr>
-                                        <p:cTn id="10" dur="1" fill="hold">
-                                          <p:stCondLst>
-                                            <p:cond delay="0"/>
-                                          </p:stCondLst>
-                                        </p:cTn>
-                                        <p:tgtEl>
-                                          <p:spTgt spid="30">
-                                            <p:txEl>
-                                              <p:pRg st="1" end="1"/>
-                                            </p:txEl>
-                                          </p:spTgt>
-                                        </p:tgtEl>
-                                        <p:attrNameLst>
-                                          <p:attrName>style.visibility</p:attrName>
-                                        </p:attrNameLst>
-                                      </p:cBhvr>
-                                      <p:to>
-                                        <p:strVal val="visible"/>
-                                      </p:to>
-                                    </p:set>
-                                  </p:childTnLst>
-                                </p:cTn>
-                              </p:par>
-                            </p:childTnLst>
-                          </p:cTn>
-                        </p:par>
-                      </p:childTnLst>
-                    </p:cTn>
-                  </p:par>
-                  <p:par>
-                    <p:cTn id="11" fill="hold">
-                      <p:stCondLst>
-                        <p:cond delay="indefinite"/>
-                      </p:stCondLst>
-                      <p:childTnLst>
-                        <p:par>
-                          <p:cTn id="12" fill="hold">
-                            <p:stCondLst>
-                              <p:cond delay="0"/>
-                            </p:stCondLst>
-                            <p:childTnLst>
-                              <p:par>
-                                <p:cTn id="13" presetID="1" presetClass="entr" presetSubtype="0" fill="hold" nodeType="clickEffect">
-                                  <p:stCondLst>
-                                    <p:cond delay="0"/>
-                                  </p:stCondLst>
-                                  <p:childTnLst>
-                                    <p:set>
-                                      <p:cBhvr>
-                                        <p:cTn id="14" dur="1" fill="hold">
-                                          <p:stCondLst>
-                                            <p:cond delay="0"/>
-                                          </p:stCondLst>
-                                        </p:cTn>
-                                        <p:tgtEl>
-                                          <p:spTgt spid="30">
-                                            <p:txEl>
-                                              <p:pRg st="2" end="2"/>
-                                            </p:txEl>
-                                          </p:spTgt>
-                                        </p:tgtEl>
-                                        <p:attrNameLst>
-                                          <p:attrName>style.visibility</p:attrName>
-                                        </p:attrNameLst>
-                                      </p:cBhvr>
-                                      <p:to>
-                                        <p:strVal val="visible"/>
-                                      </p:to>
-                                    </p:set>
-                                  </p:childTnLst>
-                                </p:cTn>
-                              </p:par>
-                            </p:childTnLst>
-                          </p:cTn>
-                        </p:par>
-                      </p:childTnLst>
-                    </p:cTn>
-                  </p:par>
-                  <p:par>
-                    <p:cTn id="15" fill="hold">
-                      <p:stCondLst>
-                        <p:cond delay="indefinite"/>
-                      </p:stCondLst>
-                      <p:childTnLst>
-                        <p:par>
-                          <p:cTn id="16" fill="hold">
-                            <p:stCondLst>
-                              <p:cond delay="0"/>
-                            </p:stCondLst>
-                            <p:childTnLst>
-                              <p:par>
-                                <p:cTn id="17" presetID="1" presetClass="entr" presetSubtype="0" fill="hold" nodeType="clickEffect">
-                                  <p:stCondLst>
-                                    <p:cond delay="0"/>
-                                  </p:stCondLst>
-                                  <p:childTnLst>
-                                    <p:set>
-                                      <p:cBhvr>
-                                        <p:cTn id="18" dur="1" fill="hold">
-                                          <p:stCondLst>
-                                            <p:cond delay="0"/>
-                                          </p:stCondLst>
-                                        </p:cTn>
-                                        <p:tgtEl>
-                                          <p:spTgt spid="30">
-                                            <p:txEl>
-                                              <p:pRg st="3" end="3"/>
-                                            </p:txEl>
-                                          </p:spTgt>
-                                        </p:tgtEl>
-                                        <p:attrNameLst>
-                                          <p:attrName>style.visibility</p:attrName>
-                                        </p:attrNameLst>
-                                      </p:cBhvr>
-                                      <p:to>
-                                        <p:strVal val="visible"/>
-                                      </p:to>
-                                    </p:set>
-                                  </p:childTnLst>
-                                </p:cTn>
-                              </p:par>
-                            </p:childTnLst>
-                          </p:cTn>
-                        </p:par>
-                      </p:childTnLst>
-                    </p:cTn>
-                  </p:par>
-                  <p:par>
-                    <p:cTn id="19" fill="hold">
-                      <p:stCondLst>
-                        <p:cond delay="indefinite"/>
-                      </p:stCondLst>
-                      <p:childTnLst>
-                        <p:par>
-                          <p:cTn id="20" fill="hold">
-                            <p:stCondLst>
-                              <p:cond delay="0"/>
-                            </p:stCondLst>
-                            <p:childTnLst>
-                              <p:par>
-                                <p:cTn id="21" presetID="1" presetClass="entr" presetSubtype="0" fill="hold" nodeType="clickEffect">
-                                  <p:stCondLst>
-                                    <p:cond delay="0"/>
-                                  </p:stCondLst>
-                                  <p:childTnLst>
-                                    <p:set>
-                                      <p:cBhvr>
-                                        <p:cTn id="22" dur="1" fill="hold">
-                                          <p:stCondLst>
-                                            <p:cond delay="0"/>
-                                          </p:stCondLst>
-                                        </p:cTn>
-                                        <p:tgtEl>
-                                          <p:spTgt spid="30">
-                                            <p:txEl>
-                                              <p:pRg st="4" end="4"/>
-                                            </p:txEl>
-                                          </p:spTgt>
-                                        </p:tgtEl>
-                                        <p:attrNameLst>
-                                          <p:attrName>style.visibility</p:attrName>
-                                        </p:attrNameLst>
-                                      </p:cBhvr>
-                                      <p:to>
-                                        <p:strVal val="visible"/>
-                                      </p:to>
-                                    </p:set>
-                                  </p:childTnLst>
-                                </p:cTn>
-                              </p:par>
-                            </p:childTnLst>
-                          </p:cTn>
-                        </p:par>
-                      </p:childTnLst>
-                    </p:cTn>
-                  </p:par>
-                </p:childTnLst>
-              </p:cTn>
-              <p:prevCondLst>
-                <p:cond evt="onPrev" delay="0">
-                  <p:tgtEl>
-                    <p:sldTgt/>
-                  </p:tgtEl>
-                </p:cond>
-              </p:prevCondLst>
-              <p:nextCondLst>
-                <p:cond evt="onNext" delay="0">
-                  <p:tgtEl>
-                    <p:sldTgt/>
-                  </p:tgtEl>
-                </p:cond>
-              </p:nextCondLst>
-            </p:seq>
-          </p:childTnLst>
-        </p:cTn>
-      </p:par>
-    </p:tnLst>
-  </p:timing>
 </p:sld>
 </file>
 
@@ -5489,58 +4691,267 @@
       </p:grpSpPr>
       <p:sp>
         <p:nvSpPr>
-          <p:cNvPr id="2" name="Title 1">
+          <p:cNvPr id="2" name="Title 1"/>
+          <p:cNvSpPr>
+            <a:spLocks noGrp="1"/>
+          </p:cNvSpPr>
+          <p:nvPr>
+            <p:ph type="title"/>
+          </p:nvPr>
+        </p:nvSpPr>
+        <p:spPr>
+          <a:xfrm>
+            <a:off x="439947" y="381000"/>
+            <a:ext cx="8119613" cy="1981200"/>
+          </a:xfrm>
+        </p:spPr>
+        <p:txBody>
+          <a:bodyPr>
+            <a:normAutofit fontScale="90000"/>
+          </a:bodyPr>
+          <a:lstStyle/>
+          <a:p>
+            <a:pPr algn="l"/>
+            <a:r>
+              <a:rPr lang="en-IN" sz="1800" dirty="0">
+                <a:latin typeface="Arial Rounded MT Bold" panose="020F0704030504030204" pitchFamily="34" charset="0"/>
+              </a:rPr>
+              <a:t>Plots on various features:</a:t>
+            </a:r>
+            <a:br>
+              <a:rPr lang="en-IN" sz="1800" dirty="0">
+                <a:latin typeface="Arial Rounded MT Bold" panose="020F0704030504030204" pitchFamily="34" charset="0"/>
+              </a:rPr>
+            </a:br>
+            <a:r>
+              <a:rPr lang="en-IN" sz="1800" dirty="0">
+                <a:latin typeface="+mn-lt"/>
+              </a:rPr>
+              <a:t> Count plot for employment type is compared with the loan defaulters here where most of the self employed are a non-loan defaulters. </a:t>
+            </a:r>
+            <a:r>
+              <a:rPr lang="en-IN" sz="1800" dirty="0" err="1">
+                <a:latin typeface="+mn-lt"/>
+              </a:rPr>
+              <a:t>Aadhar</a:t>
+            </a:r>
+            <a:r>
+              <a:rPr lang="en-IN" sz="1800" dirty="0">
+                <a:latin typeface="+mn-lt"/>
+              </a:rPr>
+              <a:t> and pan details compared with loan defaulters. Person with </a:t>
+            </a:r>
+            <a:r>
+              <a:rPr lang="en-IN" sz="1800" dirty="0" err="1">
+                <a:latin typeface="+mn-lt"/>
+              </a:rPr>
+              <a:t>aadhar</a:t>
+            </a:r>
+            <a:r>
+              <a:rPr lang="en-IN" sz="1800" dirty="0">
+                <a:latin typeface="+mn-lt"/>
+              </a:rPr>
+              <a:t> are a loan defaulter whereas its just opposite to Pan details. Significant features like disbursed amount and asset amount plotted with loan defaulters, here the distribution is almost same shows no correlation with the target variable.</a:t>
+            </a:r>
+            <a:br>
+              <a:rPr lang="en-IN" sz="1800" dirty="0">
+                <a:latin typeface="Arial Rounded MT Bold" panose="020F0704030504030204" pitchFamily="34" charset="0"/>
+              </a:rPr>
+            </a:br>
+            <a:br>
+              <a:rPr lang="en-IN" sz="1650" dirty="0">
+                <a:latin typeface="Arial Rounded MT Bold" panose="020F0704030504030204" pitchFamily="34" charset="0"/>
+              </a:rPr>
+            </a:br>
+            <a:endParaRPr lang="en-IN" sz="1650" dirty="0">
+              <a:latin typeface="Arial Rounded MT Bold" panose="020F0704030504030204" pitchFamily="34" charset="0"/>
+            </a:endParaRPr>
+          </a:p>
+        </p:txBody>
+      </p:sp>
+      <p:pic>
+        <p:nvPicPr>
+          <p:cNvPr id="4" name="Content Placeholder 3"/>
+          <p:cNvPicPr>
+            <a:picLocks noGrp="1" noChangeAspect="1"/>
+          </p:cNvPicPr>
+          <p:nvPr>
+            <p:ph idx="1"/>
+          </p:nvPr>
+        </p:nvPicPr>
+        <p:blipFill>
+          <a:blip r:embed="rId2">
             <a:extLst>
-              <a:ext uri="{FF2B5EF4-FFF2-40B4-BE49-F238E27FC236}">
-                <a16:creationId xmlns:a16="http://schemas.microsoft.com/office/drawing/2014/main" id="{E9542EDD-DD0D-4B59-816D-B4BDD445A2AC}"/>
+              <a:ext uri="{28A0092B-C50C-407E-A947-70E740481C1C}">
+                <a14:useLocalDpi xmlns:a14="http://schemas.microsoft.com/office/drawing/2010/main" val="0"/>
               </a:ext>
             </a:extLst>
-          </p:cNvPr>
-          <p:cNvSpPr>
-            <a:spLocks noGrp="1"/>
-          </p:cNvSpPr>
-          <p:nvPr>
-            <p:ph type="title"/>
-          </p:nvPr>
-        </p:nvSpPr>
-        <p:spPr/>
-        <p:txBody>
-          <a:bodyPr/>
-          <a:lstStyle/>
-          <a:p>
-            <a:endParaRPr lang="en-US"/>
-          </a:p>
-        </p:txBody>
-      </p:sp>
-      <p:sp>
-        <p:nvSpPr>
-          <p:cNvPr id="3" name="Content Placeholder 2">
+          </a:blip>
+          <a:stretch>
+            <a:fillRect/>
+          </a:stretch>
+        </p:blipFill>
+        <p:spPr>
+          <a:xfrm>
+            <a:off x="457036" y="2050628"/>
+            <a:ext cx="3052063" cy="2177370"/>
+          </a:xfrm>
+        </p:spPr>
+      </p:pic>
+      <p:pic>
+        <p:nvPicPr>
+          <p:cNvPr id="5" name="Picture 4"/>
+          <p:cNvPicPr>
+            <a:picLocks noChangeAspect="1"/>
+          </p:cNvPicPr>
+          <p:nvPr/>
+        </p:nvPicPr>
+        <p:blipFill>
+          <a:blip r:embed="rId3">
             <a:extLst>
-              <a:ext uri="{FF2B5EF4-FFF2-40B4-BE49-F238E27FC236}">
-                <a16:creationId xmlns:a16="http://schemas.microsoft.com/office/drawing/2014/main" id="{80437BBC-4056-4081-B0BD-F5B6B2E3CC4F}"/>
+              <a:ext uri="{28A0092B-C50C-407E-A947-70E740481C1C}">
+                <a14:useLocalDpi xmlns:a14="http://schemas.microsoft.com/office/drawing/2010/main" val="0"/>
               </a:ext>
             </a:extLst>
-          </p:cNvPr>
-          <p:cNvSpPr>
-            <a:spLocks noGrp="1"/>
-          </p:cNvSpPr>
-          <p:nvPr>
-            <p:ph idx="1"/>
-          </p:nvPr>
-        </p:nvSpPr>
-        <p:spPr/>
-        <p:txBody>
-          <a:bodyPr/>
-          <a:lstStyle/>
-          <a:p>
-            <a:endParaRPr lang="en-US"/>
-          </a:p>
-        </p:txBody>
-      </p:sp>
+          </a:blip>
+          <a:stretch>
+            <a:fillRect/>
+          </a:stretch>
+        </p:blipFill>
+        <p:spPr>
+          <a:xfrm>
+            <a:off x="3291853" y="2130876"/>
+            <a:ext cx="3034343" cy="2177370"/>
+          </a:xfrm>
+          <a:prstGeom prst="rect">
+            <a:avLst/>
+          </a:prstGeom>
+        </p:spPr>
+      </p:pic>
+      <p:pic>
+        <p:nvPicPr>
+          <p:cNvPr id="6" name="Picture 5"/>
+          <p:cNvPicPr>
+            <a:picLocks noChangeAspect="1"/>
+          </p:cNvPicPr>
+          <p:nvPr/>
+        </p:nvPicPr>
+        <p:blipFill>
+          <a:blip r:embed="rId4">
+            <a:extLst>
+              <a:ext uri="{28A0092B-C50C-407E-A947-70E740481C1C}">
+                <a14:useLocalDpi xmlns:a14="http://schemas.microsoft.com/office/drawing/2010/main" val="0"/>
+              </a:ext>
+            </a:extLst>
+          </a:blip>
+          <a:stretch>
+            <a:fillRect/>
+          </a:stretch>
+        </p:blipFill>
+        <p:spPr>
+          <a:xfrm>
+            <a:off x="6096990" y="2085148"/>
+            <a:ext cx="2835935" cy="2177370"/>
+          </a:xfrm>
+          <a:prstGeom prst="rect">
+            <a:avLst/>
+          </a:prstGeom>
+        </p:spPr>
+      </p:pic>
+      <p:pic>
+        <p:nvPicPr>
+          <p:cNvPr id="7" name="Picture 6"/>
+          <p:cNvPicPr>
+            <a:picLocks noChangeAspect="1"/>
+          </p:cNvPicPr>
+          <p:nvPr/>
+        </p:nvPicPr>
+        <p:blipFill>
+          <a:blip r:embed="rId5">
+            <a:extLst>
+              <a:ext uri="{28A0092B-C50C-407E-A947-70E740481C1C}">
+                <a14:useLocalDpi xmlns:a14="http://schemas.microsoft.com/office/drawing/2010/main" val="0"/>
+              </a:ext>
+            </a:extLst>
+          </a:blip>
+          <a:stretch>
+            <a:fillRect/>
+          </a:stretch>
+        </p:blipFill>
+        <p:spPr>
+          <a:xfrm>
+            <a:off x="590207" y="4522377"/>
+            <a:ext cx="2785722" cy="1989188"/>
+          </a:xfrm>
+          <a:prstGeom prst="rect">
+            <a:avLst/>
+          </a:prstGeom>
+        </p:spPr>
+      </p:pic>
+      <p:pic>
+        <p:nvPicPr>
+          <p:cNvPr id="11" name="Picture 10"/>
+          <p:cNvPicPr>
+            <a:picLocks noChangeAspect="1"/>
+          </p:cNvPicPr>
+          <p:nvPr/>
+        </p:nvPicPr>
+        <p:blipFill>
+          <a:blip r:embed="rId6">
+            <a:extLst>
+              <a:ext uri="{28A0092B-C50C-407E-A947-70E740481C1C}">
+                <a14:useLocalDpi xmlns:a14="http://schemas.microsoft.com/office/drawing/2010/main" val="0"/>
+              </a:ext>
+            </a:extLst>
+          </a:blip>
+          <a:stretch>
+            <a:fillRect/>
+          </a:stretch>
+        </p:blipFill>
+        <p:spPr>
+          <a:xfrm>
+            <a:off x="3294210" y="4476496"/>
+            <a:ext cx="2867440" cy="2035069"/>
+          </a:xfrm>
+          <a:prstGeom prst="rect">
+            <a:avLst/>
+          </a:prstGeom>
+        </p:spPr>
+      </p:pic>
+      <p:pic>
+        <p:nvPicPr>
+          <p:cNvPr id="12" name="Picture 11"/>
+          <p:cNvPicPr>
+            <a:picLocks noChangeAspect="1"/>
+          </p:cNvPicPr>
+          <p:nvPr/>
+        </p:nvPicPr>
+        <p:blipFill>
+          <a:blip r:embed="rId7">
+            <a:extLst>
+              <a:ext uri="{28A0092B-C50C-407E-A947-70E740481C1C}">
+                <a14:useLocalDpi xmlns:a14="http://schemas.microsoft.com/office/drawing/2010/main" val="0"/>
+              </a:ext>
+            </a:extLst>
+          </a:blip>
+          <a:stretch>
+            <a:fillRect/>
+          </a:stretch>
+        </p:blipFill>
+        <p:spPr>
+          <a:xfrm>
+            <a:off x="6202742" y="4353974"/>
+            <a:ext cx="2753750" cy="2131524"/>
+          </a:xfrm>
+          <a:prstGeom prst="rect">
+            <a:avLst/>
+          </a:prstGeom>
+        </p:spPr>
+      </p:pic>
     </p:spTree>
     <p:extLst>
       <p:ext uri="{BB962C8B-B14F-4D97-AF65-F5344CB8AC3E}">
-        <p14:creationId xmlns:p14="http://schemas.microsoft.com/office/powerpoint/2010/main" val="2221598392"/>
+        <p14:creationId xmlns:p14="http://schemas.microsoft.com/office/powerpoint/2010/main" val="2232089093"/>
       </p:ext>
     </p:extLst>
   </p:cSld>
@@ -5551,401 +4962,6 @@
 </file>
 
 <file path=ppt/slides/slide6.xml><?xml version="1.0" encoding="utf-8"?>
-<p:sld xmlns:a="http://schemas.openxmlformats.org/drawingml/2006/main" xmlns:r="http://schemas.openxmlformats.org/officeDocument/2006/relationships" xmlns:p="http://schemas.openxmlformats.org/presentationml/2006/main">
-  <p:cSld>
-    <p:spTree>
-      <p:nvGrpSpPr>
-        <p:cNvPr id="1" name=""/>
-        <p:cNvGrpSpPr/>
-        <p:nvPr/>
-      </p:nvGrpSpPr>
-      <p:grpSpPr>
-        <a:xfrm>
-          <a:off x="0" y="0"/>
-          <a:ext cx="0" cy="0"/>
-          <a:chOff x="0" y="0"/>
-          <a:chExt cx="0" cy="0"/>
-        </a:xfrm>
-      </p:grpSpPr>
-      <p:sp>
-        <p:nvSpPr>
-          <p:cNvPr id="4" name="Round Diagonal Corner Rectangle 3"/>
-          <p:cNvSpPr/>
-          <p:nvPr/>
-        </p:nvSpPr>
-        <p:spPr>
-          <a:xfrm>
-            <a:off x="45026" y="58880"/>
-            <a:ext cx="206087" cy="2209800"/>
-          </a:xfrm>
-          <a:prstGeom prst="round2DiagRect">
-            <a:avLst/>
-          </a:prstGeom>
-          <a:solidFill>
-            <a:srgbClr val="0070C0"/>
-          </a:solidFill>
-          <a:ln>
-            <a:solidFill>
-              <a:srgbClr val="0070C0"/>
-            </a:solidFill>
-          </a:ln>
-        </p:spPr>
-        <p:style>
-          <a:lnRef idx="2">
-            <a:schemeClr val="accent3"/>
-          </a:lnRef>
-          <a:fillRef idx="1">
-            <a:schemeClr val="lt1"/>
-          </a:fillRef>
-          <a:effectRef idx="0">
-            <a:schemeClr val="accent3"/>
-          </a:effectRef>
-          <a:fontRef idx="minor">
-            <a:schemeClr val="dk1"/>
-          </a:fontRef>
-        </p:style>
-        <p:txBody>
-          <a:bodyPr rtlCol="0" anchor="ctr"/>
-          <a:lstStyle/>
-          <a:p>
-            <a:pPr algn="ctr"/>
-            <a:endParaRPr lang="en-US"/>
-          </a:p>
-        </p:txBody>
-      </p:sp>
-      <p:sp>
-        <p:nvSpPr>
-          <p:cNvPr id="5" name="Round Diagonal Corner Rectangle 4"/>
-          <p:cNvSpPr/>
-          <p:nvPr/>
-        </p:nvSpPr>
-        <p:spPr>
-          <a:xfrm>
-            <a:off x="45026" y="2313700"/>
-            <a:ext cx="206087" cy="4461170"/>
-          </a:xfrm>
-          <a:prstGeom prst="round2DiagRect">
-            <a:avLst/>
-          </a:prstGeom>
-          <a:solidFill>
-            <a:srgbClr val="00B0F0"/>
-          </a:solidFill>
-          <a:ln>
-            <a:solidFill>
-              <a:srgbClr val="00B0F0"/>
-            </a:solidFill>
-          </a:ln>
-        </p:spPr>
-        <p:style>
-          <a:lnRef idx="2">
-            <a:schemeClr val="accent3"/>
-          </a:lnRef>
-          <a:fillRef idx="1">
-            <a:schemeClr val="lt1"/>
-          </a:fillRef>
-          <a:effectRef idx="0">
-            <a:schemeClr val="accent3"/>
-          </a:effectRef>
-          <a:fontRef idx="minor">
-            <a:schemeClr val="dk1"/>
-          </a:fontRef>
-        </p:style>
-        <p:txBody>
-          <a:bodyPr rtlCol="0" anchor="ctr"/>
-          <a:lstStyle/>
-          <a:p>
-            <a:pPr algn="ctr"/>
-            <a:endParaRPr lang="en-US"/>
-          </a:p>
-        </p:txBody>
-      </p:sp>
-      <p:sp>
-        <p:nvSpPr>
-          <p:cNvPr id="30" name="Content Placeholder 2"/>
-          <p:cNvSpPr txBox="1">
-            <a:spLocks/>
-          </p:cNvSpPr>
-          <p:nvPr/>
-        </p:nvSpPr>
-        <p:spPr>
-          <a:xfrm>
-            <a:off x="429658" y="980501"/>
-            <a:ext cx="8485742" cy="5648899"/>
-          </a:xfrm>
-          <a:prstGeom prst="rect">
-            <a:avLst/>
-          </a:prstGeom>
-        </p:spPr>
-        <p:txBody>
-          <a:bodyPr vert="horz" lIns="91440" tIns="45720" rIns="91440" bIns="45720" rtlCol="0">
-            <a:normAutofit/>
-          </a:bodyPr>
-          <a:lstStyle>
-            <a:lvl1pPr marL="0" indent="0" algn="ctr" defTabSz="914400" rtl="0" eaLnBrk="1" latinLnBrk="0" hangingPunct="1">
-              <a:spcBef>
-                <a:spcPct val="20000"/>
-              </a:spcBef>
-              <a:buFont typeface="Arial" panose="020B0604020202020204" pitchFamily="34" charset="0"/>
-              <a:buNone/>
-              <a:defRPr sz="3200" kern="1200">
-                <a:solidFill>
-                  <a:schemeClr val="tx1">
-                    <a:tint val="75000"/>
-                  </a:schemeClr>
-                </a:solidFill>
-                <a:latin typeface="+mn-lt"/>
-                <a:ea typeface="+mn-ea"/>
-                <a:cs typeface="+mn-cs"/>
-              </a:defRPr>
-            </a:lvl1pPr>
-            <a:lvl2pPr marL="457200" indent="0" algn="ctr" defTabSz="914400" rtl="0" eaLnBrk="1" latinLnBrk="0" hangingPunct="1">
-              <a:spcBef>
-                <a:spcPct val="20000"/>
-              </a:spcBef>
-              <a:buFont typeface="Arial" panose="020B0604020202020204" pitchFamily="34" charset="0"/>
-              <a:buNone/>
-              <a:defRPr sz="2800" kern="1200">
-                <a:solidFill>
-                  <a:schemeClr val="tx1">
-                    <a:tint val="75000"/>
-                  </a:schemeClr>
-                </a:solidFill>
-                <a:latin typeface="+mn-lt"/>
-                <a:ea typeface="+mn-ea"/>
-                <a:cs typeface="+mn-cs"/>
-              </a:defRPr>
-            </a:lvl2pPr>
-            <a:lvl3pPr marL="914400" indent="0" algn="ctr" defTabSz="914400" rtl="0" eaLnBrk="1" latinLnBrk="0" hangingPunct="1">
-              <a:spcBef>
-                <a:spcPct val="20000"/>
-              </a:spcBef>
-              <a:buFont typeface="Arial" panose="020B0604020202020204" pitchFamily="34" charset="0"/>
-              <a:buNone/>
-              <a:defRPr sz="2400" kern="1200">
-                <a:solidFill>
-                  <a:schemeClr val="tx1">
-                    <a:tint val="75000"/>
-                  </a:schemeClr>
-                </a:solidFill>
-                <a:latin typeface="+mn-lt"/>
-                <a:ea typeface="+mn-ea"/>
-                <a:cs typeface="+mn-cs"/>
-              </a:defRPr>
-            </a:lvl3pPr>
-            <a:lvl4pPr marL="1371600" indent="0" algn="ctr" defTabSz="914400" rtl="0" eaLnBrk="1" latinLnBrk="0" hangingPunct="1">
-              <a:spcBef>
-                <a:spcPct val="20000"/>
-              </a:spcBef>
-              <a:buFont typeface="Arial" panose="020B0604020202020204" pitchFamily="34" charset="0"/>
-              <a:buNone/>
-              <a:defRPr sz="2000" kern="1200">
-                <a:solidFill>
-                  <a:schemeClr val="tx1">
-                    <a:tint val="75000"/>
-                  </a:schemeClr>
-                </a:solidFill>
-                <a:latin typeface="+mn-lt"/>
-                <a:ea typeface="+mn-ea"/>
-                <a:cs typeface="+mn-cs"/>
-              </a:defRPr>
-            </a:lvl4pPr>
-            <a:lvl5pPr marL="1828800" indent="0" algn="ctr" defTabSz="914400" rtl="0" eaLnBrk="1" latinLnBrk="0" hangingPunct="1">
-              <a:spcBef>
-                <a:spcPct val="20000"/>
-              </a:spcBef>
-              <a:buFont typeface="Arial" panose="020B0604020202020204" pitchFamily="34" charset="0"/>
-              <a:buNone/>
-              <a:defRPr sz="2000" kern="1200">
-                <a:solidFill>
-                  <a:schemeClr val="tx1">
-                    <a:tint val="75000"/>
-                  </a:schemeClr>
-                </a:solidFill>
-                <a:latin typeface="+mn-lt"/>
-                <a:ea typeface="+mn-ea"/>
-                <a:cs typeface="+mn-cs"/>
-              </a:defRPr>
-            </a:lvl5pPr>
-            <a:lvl6pPr marL="2286000" indent="0" algn="ctr" defTabSz="914400" rtl="0" eaLnBrk="1" latinLnBrk="0" hangingPunct="1">
-              <a:spcBef>
-                <a:spcPct val="20000"/>
-              </a:spcBef>
-              <a:buFont typeface="Arial" panose="020B0604020202020204" pitchFamily="34" charset="0"/>
-              <a:buNone/>
-              <a:defRPr sz="2000" kern="1200">
-                <a:solidFill>
-                  <a:schemeClr val="tx1">
-                    <a:tint val="75000"/>
-                  </a:schemeClr>
-                </a:solidFill>
-                <a:latin typeface="+mn-lt"/>
-                <a:ea typeface="+mn-ea"/>
-                <a:cs typeface="+mn-cs"/>
-              </a:defRPr>
-            </a:lvl6pPr>
-            <a:lvl7pPr marL="2743200" indent="0" algn="ctr" defTabSz="914400" rtl="0" eaLnBrk="1" latinLnBrk="0" hangingPunct="1">
-              <a:spcBef>
-                <a:spcPct val="20000"/>
-              </a:spcBef>
-              <a:buFont typeface="Arial" panose="020B0604020202020204" pitchFamily="34" charset="0"/>
-              <a:buNone/>
-              <a:defRPr sz="2000" kern="1200">
-                <a:solidFill>
-                  <a:schemeClr val="tx1">
-                    <a:tint val="75000"/>
-                  </a:schemeClr>
-                </a:solidFill>
-                <a:latin typeface="+mn-lt"/>
-                <a:ea typeface="+mn-ea"/>
-                <a:cs typeface="+mn-cs"/>
-              </a:defRPr>
-            </a:lvl7pPr>
-            <a:lvl8pPr marL="3200400" indent="0" algn="ctr" defTabSz="914400" rtl="0" eaLnBrk="1" latinLnBrk="0" hangingPunct="1">
-              <a:spcBef>
-                <a:spcPct val="20000"/>
-              </a:spcBef>
-              <a:buFont typeface="Arial" panose="020B0604020202020204" pitchFamily="34" charset="0"/>
-              <a:buNone/>
-              <a:defRPr sz="2000" kern="1200">
-                <a:solidFill>
-                  <a:schemeClr val="tx1">
-                    <a:tint val="75000"/>
-                  </a:schemeClr>
-                </a:solidFill>
-                <a:latin typeface="+mn-lt"/>
-                <a:ea typeface="+mn-ea"/>
-                <a:cs typeface="+mn-cs"/>
-              </a:defRPr>
-            </a:lvl8pPr>
-            <a:lvl9pPr marL="3657600" indent="0" algn="ctr" defTabSz="914400" rtl="0" eaLnBrk="1" latinLnBrk="0" hangingPunct="1">
-              <a:spcBef>
-                <a:spcPct val="20000"/>
-              </a:spcBef>
-              <a:buFont typeface="Arial" panose="020B0604020202020204" pitchFamily="34" charset="0"/>
-              <a:buNone/>
-              <a:defRPr sz="2000" kern="1200">
-                <a:solidFill>
-                  <a:schemeClr val="tx1">
-                    <a:tint val="75000"/>
-                  </a:schemeClr>
-                </a:solidFill>
-                <a:latin typeface="+mn-lt"/>
-                <a:ea typeface="+mn-ea"/>
-                <a:cs typeface="+mn-cs"/>
-              </a:defRPr>
-            </a:lvl9pPr>
-          </a:lstStyle>
-          <a:p>
-            <a:pPr marL="342900" indent="-342900" algn="l">
-              <a:buFont typeface="Wingdings" panose="05000000000000000000" pitchFamily="2" charset="2"/>
-              <a:buChar char="Ø"/>
-            </a:pPr>
-            <a:endParaRPr lang="en-IN" sz="2400" dirty="0">
-              <a:solidFill>
-                <a:srgbClr val="0055A0"/>
-              </a:solidFill>
-            </a:endParaRPr>
-          </a:p>
-        </p:txBody>
-      </p:sp>
-    </p:spTree>
-    <p:extLst>
-      <p:ext uri="{BB962C8B-B14F-4D97-AF65-F5344CB8AC3E}">
-        <p14:creationId xmlns:p14="http://schemas.microsoft.com/office/powerpoint/2010/main" val="2389067596"/>
-      </p:ext>
-    </p:extLst>
-  </p:cSld>
-  <p:clrMapOvr>
-    <a:masterClrMapping/>
-  </p:clrMapOvr>
-  <p:timing>
-    <p:tnLst>
-      <p:par>
-        <p:cTn id="1" dur="indefinite" restart="never" nodeType="tmRoot">
-          <p:childTnLst>
-            <p:seq concurrent="1" nextAc="seek">
-              <p:cTn id="2" dur="indefinite" nodeType="mainSeq">
-                <p:childTnLst>
-                  <p:par>
-                    <p:cTn id="3" fill="hold">
-                      <p:stCondLst>
-                        <p:cond delay="indefinite"/>
-                      </p:stCondLst>
-                      <p:childTnLst>
-                        <p:par>
-                          <p:cTn id="4" fill="hold">
-                            <p:stCondLst>
-                              <p:cond delay="0"/>
-                            </p:stCondLst>
-                            <p:childTnLst>
-                              <p:par>
-                                <p:cTn id="5" presetID="1" presetClass="entr" presetSubtype="0" fill="hold" nodeType="clickEffect" nodePh="1">
-                                  <p:stCondLst>
-                                    <p:cond delay="0"/>
-                                  </p:stCondLst>
-                                  <p:endCondLst>
-                                    <p:cond evt="begin" delay="0">
-                                      <p:tn val="5"/>
-                                    </p:cond>
-                                  </p:endCondLst>
-                                  <p:childTnLst>
-                                    <p:set>
-                                      <p:cBhvr>
-                                        <p:cTn id="6" dur="1" fill="hold">
-                                          <p:stCondLst>
-                                            <p:cond delay="0"/>
-                                          </p:stCondLst>
-                                        </p:cTn>
-                                        <p:tgtEl>
-                                          <p:spTgt spid="30">
-                                            <p:txEl>
-                                              <p:pRg st="0" end="0"/>
-                                            </p:txEl>
-                                          </p:spTgt>
-                                        </p:tgtEl>
-                                        <p:attrNameLst>
-                                          <p:attrName>style.visibility</p:attrName>
-                                        </p:attrNameLst>
-                                      </p:cBhvr>
-                                      <p:to>
-                                        <p:strVal val="visible"/>
-                                      </p:to>
-                                    </p:set>
-                                  </p:childTnLst>
-                                </p:cTn>
-                              </p:par>
-                            </p:childTnLst>
-                          </p:cTn>
-                        </p:par>
-                      </p:childTnLst>
-                    </p:cTn>
-                  </p:par>
-                </p:childTnLst>
-              </p:cTn>
-              <p:prevCondLst>
-                <p:cond evt="onPrev" delay="0">
-                  <p:tgtEl>
-                    <p:sldTgt/>
-                  </p:tgtEl>
-                </p:cond>
-              </p:prevCondLst>
-              <p:nextCondLst>
-                <p:cond evt="onNext" delay="0">
-                  <p:tgtEl>
-                    <p:sldTgt/>
-                  </p:tgtEl>
-                </p:cond>
-              </p:nextCondLst>
-            </p:seq>
-          </p:childTnLst>
-        </p:cTn>
-      </p:par>
-    </p:tnLst>
-  </p:timing>
-</p:sld>
-</file>
-
-<file path=ppt/slides/slide7.xml><?xml version="1.0" encoding="utf-8"?>
 <p:sld xmlns:a="http://schemas.openxmlformats.org/drawingml/2006/main" xmlns:r="http://schemas.openxmlformats.org/officeDocument/2006/relationships" xmlns:p="http://schemas.openxmlformats.org/presentationml/2006/main">
   <p:cSld>
     <p:spTree>
@@ -6366,6 +5382,167 @@
 </p:sld>
 </file>
 
+<file path=ppt/slides/slide7.xml><?xml version="1.0" encoding="utf-8"?>
+<p:sld xmlns:a="http://schemas.openxmlformats.org/drawingml/2006/main" xmlns:r="http://schemas.openxmlformats.org/officeDocument/2006/relationships" xmlns:p="http://schemas.openxmlformats.org/presentationml/2006/main">
+  <p:cSld>
+    <p:spTree>
+      <p:nvGrpSpPr>
+        <p:cNvPr id="1" name=""/>
+        <p:cNvGrpSpPr/>
+        <p:nvPr/>
+      </p:nvGrpSpPr>
+      <p:grpSpPr>
+        <a:xfrm>
+          <a:off x="0" y="0"/>
+          <a:ext cx="0" cy="0"/>
+          <a:chOff x="0" y="0"/>
+          <a:chExt cx="0" cy="0"/>
+        </a:xfrm>
+      </p:grpSpPr>
+      <p:sp>
+        <p:nvSpPr>
+          <p:cNvPr id="2" name="Title 1">
+            <a:extLst>
+              <a:ext uri="{FF2B5EF4-FFF2-40B4-BE49-F238E27FC236}">
+                <a16:creationId xmlns:a16="http://schemas.microsoft.com/office/drawing/2014/main" id="{541A397E-F577-49FF-BC80-010E4660590D}"/>
+              </a:ext>
+            </a:extLst>
+          </p:cNvPr>
+          <p:cNvSpPr>
+            <a:spLocks noGrp="1"/>
+          </p:cNvSpPr>
+          <p:nvPr>
+            <p:ph type="title"/>
+          </p:nvPr>
+        </p:nvSpPr>
+        <p:spPr/>
+        <p:txBody>
+          <a:bodyPr/>
+          <a:lstStyle/>
+          <a:p>
+            <a:r>
+              <a:rPr lang="en-US" dirty="0"/>
+              <a:t>Feature Engineering</a:t>
+            </a:r>
+          </a:p>
+        </p:txBody>
+      </p:sp>
+      <p:sp>
+        <p:nvSpPr>
+          <p:cNvPr id="3" name="Content Placeholder 2">
+            <a:extLst>
+              <a:ext uri="{FF2B5EF4-FFF2-40B4-BE49-F238E27FC236}">
+                <a16:creationId xmlns:a16="http://schemas.microsoft.com/office/drawing/2014/main" id="{4887195E-57E5-4EF2-9755-BE81F07132A4}"/>
+              </a:ext>
+            </a:extLst>
+          </p:cNvPr>
+          <p:cNvSpPr>
+            <a:spLocks noGrp="1"/>
+          </p:cNvSpPr>
+          <p:nvPr>
+            <p:ph idx="1"/>
+          </p:nvPr>
+        </p:nvSpPr>
+        <p:spPr/>
+        <p:txBody>
+          <a:bodyPr>
+            <a:normAutofit/>
+          </a:bodyPr>
+          <a:lstStyle/>
+          <a:p>
+            <a:pPr marL="0" indent="0">
+              <a:buNone/>
+            </a:pPr>
+            <a:r>
+              <a:rPr lang="en-IN" sz="2400" dirty="0"/>
+              <a:t>1. </a:t>
+            </a:r>
+            <a:r>
+              <a:rPr lang="en-IN" sz="2400" b="1" dirty="0"/>
+              <a:t>Transformations</a:t>
+            </a:r>
+            <a:r>
+              <a:rPr lang="en-IN" sz="2400" dirty="0"/>
+              <a:t> :</a:t>
+            </a:r>
+          </a:p>
+          <a:p>
+            <a:pPr marL="0" indent="0">
+              <a:buNone/>
+            </a:pPr>
+            <a:r>
+              <a:rPr lang="en-IN" sz="2400" dirty="0"/>
+              <a:t>Yes . Since the data is not normally distributed (Highly right skewed), We tried Log transform, Sqrt transform.</a:t>
+            </a:r>
+          </a:p>
+          <a:p>
+            <a:pPr marL="0" indent="0">
+              <a:buNone/>
+            </a:pPr>
+            <a:r>
+              <a:rPr lang="en-IN" sz="2400" dirty="0"/>
+              <a:t>2. </a:t>
+            </a:r>
+            <a:r>
+              <a:rPr lang="en-IN" sz="2400" b="1" dirty="0"/>
+              <a:t>Scaling the data </a:t>
+            </a:r>
+            <a:r>
+              <a:rPr lang="en-IN" sz="2400" dirty="0"/>
+              <a:t>:</a:t>
+            </a:r>
+          </a:p>
+          <a:p>
+            <a:pPr marL="0" indent="0">
+              <a:buNone/>
+            </a:pPr>
+            <a:r>
+              <a:rPr lang="en-IN" sz="2400" dirty="0"/>
+              <a:t>Yes, the data has been scaled.</a:t>
+            </a:r>
+          </a:p>
+          <a:p>
+            <a:pPr marL="0" indent="0">
+              <a:buNone/>
+            </a:pPr>
+            <a:r>
+              <a:rPr lang="en-IN" sz="2400" dirty="0"/>
+              <a:t>3. </a:t>
+            </a:r>
+            <a:r>
+              <a:rPr lang="en-IN" sz="2400" b="1" dirty="0"/>
+              <a:t>Dimensionality reduction </a:t>
+            </a:r>
+            <a:r>
+              <a:rPr lang="en-IN" sz="2400" dirty="0"/>
+              <a:t>:</a:t>
+            </a:r>
+          </a:p>
+          <a:p>
+            <a:pPr marL="0" indent="0">
+              <a:buNone/>
+            </a:pPr>
+            <a:r>
+              <a:rPr lang="en-IN" sz="2400" dirty="0"/>
+              <a:t> Since there is no multicollinearity in our data, We haven’t done PCA.</a:t>
+            </a:r>
+            <a:endParaRPr lang="en-US" sz="2400" dirty="0"/>
+          </a:p>
+        </p:txBody>
+      </p:sp>
+    </p:spTree>
+    <p:extLst>
+      <p:ext uri="{BB962C8B-B14F-4D97-AF65-F5344CB8AC3E}">
+        <p14:creationId xmlns:p14="http://schemas.microsoft.com/office/powerpoint/2010/main" val="3227524239"/>
+      </p:ext>
+    </p:extLst>
+  </p:cSld>
+  <p:clrMapOvr>
+    <a:masterClrMapping/>
+  </p:clrMapOvr>
+</p:sld>
+</file>
+
 <file path=ppt/slides/slide8.xml><?xml version="1.0" encoding="utf-8"?>
 <p:sld xmlns:a="http://schemas.openxmlformats.org/drawingml/2006/main" xmlns:r="http://schemas.openxmlformats.org/officeDocument/2006/relationships" xmlns:p="http://schemas.openxmlformats.org/presentationml/2006/main">
   <p:cSld>
@@ -6388,7 +5565,7 @@
           <p:cNvPr id="2" name="Title 1">
             <a:extLst>
               <a:ext uri="{FF2B5EF4-FFF2-40B4-BE49-F238E27FC236}">
-                <a16:creationId xmlns:a16="http://schemas.microsoft.com/office/drawing/2014/main" id="{541A397E-F577-49FF-BC80-010E4660590D}"/>
+                <a16:creationId xmlns:a16="http://schemas.microsoft.com/office/drawing/2014/main" id="{F6584AFD-6D6B-41BD-8AA7-E55CA8893D30}"/>
               </a:ext>
             </a:extLst>
           </p:cNvPr>
@@ -6406,7 +5583,7 @@
           <a:p>
             <a:r>
               <a:rPr lang="en-US" dirty="0"/>
-              <a:t>Feature Engineering</a:t>
+              <a:t>Assumptions</a:t>
             </a:r>
           </a:p>
         </p:txBody>
@@ -6416,7 +5593,7 @@
           <p:cNvPr id="3" name="Content Placeholder 2">
             <a:extLst>
               <a:ext uri="{FF2B5EF4-FFF2-40B4-BE49-F238E27FC236}">
-                <a16:creationId xmlns:a16="http://schemas.microsoft.com/office/drawing/2014/main" id="{4887195E-57E5-4EF2-9755-BE81F07132A4}"/>
+                <a16:creationId xmlns:a16="http://schemas.microsoft.com/office/drawing/2014/main" id="{1DD175B5-E4E4-4BD1-8A11-20DED898F8EA}"/>
               </a:ext>
             </a:extLst>
           </p:cNvPr>
@@ -6434,90 +5611,62 @@
           </a:bodyPr>
           <a:lstStyle/>
           <a:p>
+            <a:r>
+              <a:rPr lang="en-IN" sz="2400" b="1" dirty="0"/>
+              <a:t>General Assumptions: </a:t>
+            </a:r>
+          </a:p>
+          <a:p>
             <a:pPr marL="0" indent="0">
               <a:buNone/>
             </a:pPr>
             <a:r>
               <a:rPr lang="en-IN" sz="2400" dirty="0"/>
-              <a:t>1. </a:t>
-            </a:r>
+              <a:t>      -&gt; No redundant data.</a:t>
+            </a:r>
+          </a:p>
+          <a:p>
+            <a:pPr marL="0" indent="0">
+              <a:buNone/>
+            </a:pPr>
             <a:r>
               <a:rPr lang="en-IN" sz="2400" b="1" dirty="0"/>
-              <a:t>Transformations</a:t>
+              <a:t>      </a:t>
             </a:r>
             <a:r>
               <a:rPr lang="en-IN" sz="2400" dirty="0"/>
-              <a:t> :</a:t>
-            </a:r>
-          </a:p>
-          <a:p>
-            <a:pPr marL="0" indent="0">
-              <a:buNone/>
-            </a:pPr>
-            <a:r>
-              <a:rPr lang="en-IN" sz="2400" dirty="0"/>
-              <a:t>Yes . Since the data is not normally distributed (Highly right skewed), We tried Log transform, Sqrt transform.</a:t>
-            </a:r>
-          </a:p>
-          <a:p>
-            <a:pPr marL="0" indent="0">
-              <a:buNone/>
-            </a:pPr>
-            <a:r>
-              <a:rPr lang="en-IN" sz="2400" dirty="0"/>
-              <a:t>2. </a:t>
-            </a:r>
+              <a:t>-&gt; Absence of Multicollinearity</a:t>
+            </a:r>
+          </a:p>
+          <a:p>
             <a:r>
               <a:rPr lang="en-IN" sz="2400" b="1" dirty="0"/>
-              <a:t>Scaling the data </a:t>
-            </a:r>
-            <a:r>
-              <a:rPr lang="en-IN" sz="2400" dirty="0"/>
-              <a:t>:</a:t>
-            </a:r>
-          </a:p>
-          <a:p>
-            <a:pPr marL="0" indent="0">
-              <a:buNone/>
-            </a:pPr>
-            <a:r>
-              <a:rPr lang="en-IN" sz="2400" dirty="0"/>
-              <a:t>Yes, the data has been scaled.</a:t>
-            </a:r>
-          </a:p>
-          <a:p>
-            <a:pPr marL="0" indent="0">
-              <a:buNone/>
-            </a:pPr>
-            <a:r>
-              <a:rPr lang="en-IN" sz="2400" dirty="0"/>
-              <a:t>3. </a:t>
-            </a:r>
-            <a:r>
-              <a:rPr lang="en-IN" sz="2400" b="1" dirty="0"/>
-              <a:t>Dimensionality reduction </a:t>
-            </a:r>
-            <a:r>
-              <a:rPr lang="en-IN" sz="2400" dirty="0"/>
-              <a:t>:</a:t>
-            </a:r>
-          </a:p>
-          <a:p>
-            <a:pPr marL="0" indent="0">
-              <a:buNone/>
-            </a:pPr>
-            <a:r>
-              <a:rPr lang="en-IN" sz="2400" dirty="0"/>
-              <a:t> Since there is no multicollinearity in our data, We haven’t done PCA.</a:t>
-            </a:r>
-            <a:endParaRPr lang="en-US" sz="2400" dirty="0"/>
+              <a:t>Naive Bayes</a:t>
+            </a:r>
+            <a:r>
+              <a:rPr lang="en-US" sz="2400" b="1" dirty="0"/>
+              <a:t> -  </a:t>
+            </a:r>
+            <a:r>
+              <a:rPr lang="en-US" sz="2400" dirty="0"/>
+              <a:t>Attributes are conditionally independent.</a:t>
+            </a:r>
+          </a:p>
+          <a:p>
+            <a:r>
+              <a:rPr lang="en-US" sz="2400" dirty="0"/>
+              <a:t>Decision Tree, Random Forest, KNN – No assumptions</a:t>
+            </a:r>
+          </a:p>
+          <a:p>
+            <a:endParaRPr lang="en-IN" sz="2400" b="1" dirty="0"/>
           </a:p>
         </p:txBody>
       </p:sp>
     </p:spTree>
     <p:extLst>
       <p:ext uri="{BB962C8B-B14F-4D97-AF65-F5344CB8AC3E}">
-        <p14:creationId xmlns:p14="http://schemas.microsoft.com/office/powerpoint/2010/main" val="3227524239"/>
+        <p14:creationId xmlns:p14="http://schemas.microsoft.com/office/powerpoint/2010/main" val="1235205643"/>
       </p:ext>
     </p:extLst>
   </p:cSld>
@@ -6546,111 +5695,297 @@
       </p:grpSpPr>
       <p:sp>
         <p:nvSpPr>
-          <p:cNvPr id="2" name="Title 1">
-            <a:extLst>
-              <a:ext uri="{FF2B5EF4-FFF2-40B4-BE49-F238E27FC236}">
-                <a16:creationId xmlns:a16="http://schemas.microsoft.com/office/drawing/2014/main" id="{F6584AFD-6D6B-41BD-8AA7-E55CA8893D30}"/>
-              </a:ext>
-            </a:extLst>
-          </p:cNvPr>
-          <p:cNvSpPr>
-            <a:spLocks noGrp="1"/>
-          </p:cNvSpPr>
-          <p:nvPr>
-            <p:ph type="title"/>
-          </p:nvPr>
-        </p:nvSpPr>
-        <p:spPr/>
-        <p:txBody>
-          <a:bodyPr/>
-          <a:lstStyle/>
-          <a:p>
-            <a:r>
-              <a:rPr lang="en-US" dirty="0"/>
-              <a:t>Assumptions</a:t>
-            </a:r>
-          </a:p>
-        </p:txBody>
-      </p:sp>
-      <p:sp>
-        <p:nvSpPr>
-          <p:cNvPr id="3" name="Content Placeholder 2">
-            <a:extLst>
-              <a:ext uri="{FF2B5EF4-FFF2-40B4-BE49-F238E27FC236}">
-                <a16:creationId xmlns:a16="http://schemas.microsoft.com/office/drawing/2014/main" id="{1DD175B5-E4E4-4BD1-8A11-20DED898F8EA}"/>
-              </a:ext>
-            </a:extLst>
-          </p:cNvPr>
-          <p:cNvSpPr>
-            <a:spLocks noGrp="1"/>
-          </p:cNvSpPr>
-          <p:nvPr>
-            <p:ph idx="1"/>
-          </p:nvPr>
-        </p:nvSpPr>
-        <p:spPr/>
-        <p:txBody>
-          <a:bodyPr>
+          <p:cNvPr id="4" name="Round Diagonal Corner Rectangle 3"/>
+          <p:cNvSpPr/>
+          <p:nvPr/>
+        </p:nvSpPr>
+        <p:spPr>
+          <a:xfrm>
+            <a:off x="45026" y="58880"/>
+            <a:ext cx="206087" cy="2209800"/>
+          </a:xfrm>
+          <a:prstGeom prst="round2DiagRect">
+            <a:avLst/>
+          </a:prstGeom>
+          <a:solidFill>
+            <a:srgbClr val="0070C0"/>
+          </a:solidFill>
+          <a:ln>
+            <a:solidFill>
+              <a:srgbClr val="0070C0"/>
+            </a:solidFill>
+          </a:ln>
+        </p:spPr>
+        <p:style>
+          <a:lnRef idx="2">
+            <a:schemeClr val="accent3"/>
+          </a:lnRef>
+          <a:fillRef idx="1">
+            <a:schemeClr val="lt1"/>
+          </a:fillRef>
+          <a:effectRef idx="0">
+            <a:schemeClr val="accent3"/>
+          </a:effectRef>
+          <a:fontRef idx="minor">
+            <a:schemeClr val="dk1"/>
+          </a:fontRef>
+        </p:style>
+        <p:txBody>
+          <a:bodyPr rtlCol="0" anchor="ctr"/>
+          <a:lstStyle/>
+          <a:p>
+            <a:pPr algn="ctr"/>
+            <a:endParaRPr lang="en-US"/>
+          </a:p>
+        </p:txBody>
+      </p:sp>
+      <p:sp>
+        <p:nvSpPr>
+          <p:cNvPr id="5" name="Round Diagonal Corner Rectangle 4"/>
+          <p:cNvSpPr/>
+          <p:nvPr/>
+        </p:nvSpPr>
+        <p:spPr>
+          <a:xfrm>
+            <a:off x="45026" y="2313700"/>
+            <a:ext cx="206087" cy="4461170"/>
+          </a:xfrm>
+          <a:prstGeom prst="round2DiagRect">
+            <a:avLst/>
+          </a:prstGeom>
+          <a:solidFill>
+            <a:srgbClr val="00B0F0"/>
+          </a:solidFill>
+          <a:ln>
+            <a:solidFill>
+              <a:srgbClr val="00B0F0"/>
+            </a:solidFill>
+          </a:ln>
+        </p:spPr>
+        <p:style>
+          <a:lnRef idx="2">
+            <a:schemeClr val="accent3"/>
+          </a:lnRef>
+          <a:fillRef idx="1">
+            <a:schemeClr val="lt1"/>
+          </a:fillRef>
+          <a:effectRef idx="0">
+            <a:schemeClr val="accent3"/>
+          </a:effectRef>
+          <a:fontRef idx="minor">
+            <a:schemeClr val="dk1"/>
+          </a:fontRef>
+        </p:style>
+        <p:txBody>
+          <a:bodyPr rtlCol="0" anchor="ctr"/>
+          <a:lstStyle/>
+          <a:p>
+            <a:pPr algn="ctr"/>
+            <a:endParaRPr lang="en-US"/>
+          </a:p>
+        </p:txBody>
+      </p:sp>
+      <p:sp>
+        <p:nvSpPr>
+          <p:cNvPr id="9" name="Content Placeholder 2"/>
+          <p:cNvSpPr txBox="1">
+            <a:spLocks/>
+          </p:cNvSpPr>
+          <p:nvPr/>
+        </p:nvSpPr>
+        <p:spPr>
+          <a:xfrm>
+            <a:off x="3042062" y="1958439"/>
+            <a:ext cx="4730338" cy="1546761"/>
+          </a:xfrm>
+          <a:prstGeom prst="rect">
+            <a:avLst/>
+          </a:prstGeom>
+        </p:spPr>
+        <p:txBody>
+          <a:bodyPr vert="horz" lIns="91440" tIns="45720" rIns="91440" bIns="45720" rtlCol="0">
             <a:normAutofit/>
           </a:bodyPr>
-          <a:lstStyle/>
-          <a:p>
-            <a:r>
-              <a:rPr lang="en-IN" sz="2400" b="1" dirty="0"/>
-              <a:t>General Assumptions: </a:t>
-            </a:r>
-          </a:p>
-          <a:p>
-            <a:pPr marL="0" indent="0">
-              <a:buNone/>
-            </a:pPr>
-            <a:r>
-              <a:rPr lang="en-IN" sz="2400" dirty="0"/>
-              <a:t>      -&gt; No redundant data.</a:t>
-            </a:r>
-          </a:p>
-          <a:p>
-            <a:pPr marL="0" indent="0">
-              <a:buNone/>
-            </a:pPr>
-            <a:r>
-              <a:rPr lang="en-IN" sz="2400" b="1" dirty="0"/>
-              <a:t>      </a:t>
-            </a:r>
-            <a:r>
-              <a:rPr lang="en-IN" sz="2400" dirty="0"/>
-              <a:t>-&gt; Absence of Multicollinearity</a:t>
-            </a:r>
-          </a:p>
-          <a:p>
-            <a:r>
-              <a:rPr lang="en-IN" sz="2400" b="1" dirty="0"/>
-              <a:t>Naive Bayes</a:t>
-            </a:r>
-            <a:r>
-              <a:rPr lang="en-US" sz="2400" b="1" dirty="0"/>
-              <a:t> -  </a:t>
-            </a:r>
-            <a:r>
-              <a:rPr lang="en-US" sz="2400" dirty="0"/>
-              <a:t>Attributes are conditionally independent.</a:t>
-            </a:r>
-          </a:p>
-          <a:p>
-            <a:r>
-              <a:rPr lang="en-US" sz="2400" dirty="0"/>
-              <a:t>Decision Tree, Random Forest, KNN – No assumptions</a:t>
-            </a:r>
-          </a:p>
-          <a:p>
-            <a:endParaRPr lang="en-IN" sz="2400" b="1" dirty="0"/>
+          <a:lstStyle>
+            <a:lvl1pPr marL="0" indent="0" algn="ctr" defTabSz="914400" rtl="0" eaLnBrk="1" latinLnBrk="0" hangingPunct="1">
+              <a:spcBef>
+                <a:spcPct val="20000"/>
+              </a:spcBef>
+              <a:buFont typeface="Arial" panose="020B0604020202020204" pitchFamily="34" charset="0"/>
+              <a:buNone/>
+              <a:defRPr sz="3200" kern="1200">
+                <a:solidFill>
+                  <a:schemeClr val="tx1">
+                    <a:tint val="75000"/>
+                  </a:schemeClr>
+                </a:solidFill>
+                <a:latin typeface="+mn-lt"/>
+                <a:ea typeface="+mn-ea"/>
+                <a:cs typeface="+mn-cs"/>
+              </a:defRPr>
+            </a:lvl1pPr>
+            <a:lvl2pPr marL="457200" indent="0" algn="ctr" defTabSz="914400" rtl="0" eaLnBrk="1" latinLnBrk="0" hangingPunct="1">
+              <a:spcBef>
+                <a:spcPct val="20000"/>
+              </a:spcBef>
+              <a:buFont typeface="Arial" panose="020B0604020202020204" pitchFamily="34" charset="0"/>
+              <a:buNone/>
+              <a:defRPr sz="2800" kern="1200">
+                <a:solidFill>
+                  <a:schemeClr val="tx1">
+                    <a:tint val="75000"/>
+                  </a:schemeClr>
+                </a:solidFill>
+                <a:latin typeface="+mn-lt"/>
+                <a:ea typeface="+mn-ea"/>
+                <a:cs typeface="+mn-cs"/>
+              </a:defRPr>
+            </a:lvl2pPr>
+            <a:lvl3pPr marL="914400" indent="0" algn="ctr" defTabSz="914400" rtl="0" eaLnBrk="1" latinLnBrk="0" hangingPunct="1">
+              <a:spcBef>
+                <a:spcPct val="20000"/>
+              </a:spcBef>
+              <a:buFont typeface="Arial" panose="020B0604020202020204" pitchFamily="34" charset="0"/>
+              <a:buNone/>
+              <a:defRPr sz="2400" kern="1200">
+                <a:solidFill>
+                  <a:schemeClr val="tx1">
+                    <a:tint val="75000"/>
+                  </a:schemeClr>
+                </a:solidFill>
+                <a:latin typeface="+mn-lt"/>
+                <a:ea typeface="+mn-ea"/>
+                <a:cs typeface="+mn-cs"/>
+              </a:defRPr>
+            </a:lvl3pPr>
+            <a:lvl4pPr marL="1371600" indent="0" algn="ctr" defTabSz="914400" rtl="0" eaLnBrk="1" latinLnBrk="0" hangingPunct="1">
+              <a:spcBef>
+                <a:spcPct val="20000"/>
+              </a:spcBef>
+              <a:buFont typeface="Arial" panose="020B0604020202020204" pitchFamily="34" charset="0"/>
+              <a:buNone/>
+              <a:defRPr sz="2000" kern="1200">
+                <a:solidFill>
+                  <a:schemeClr val="tx1">
+                    <a:tint val="75000"/>
+                  </a:schemeClr>
+                </a:solidFill>
+                <a:latin typeface="+mn-lt"/>
+                <a:ea typeface="+mn-ea"/>
+                <a:cs typeface="+mn-cs"/>
+              </a:defRPr>
+            </a:lvl4pPr>
+            <a:lvl5pPr marL="1828800" indent="0" algn="ctr" defTabSz="914400" rtl="0" eaLnBrk="1" latinLnBrk="0" hangingPunct="1">
+              <a:spcBef>
+                <a:spcPct val="20000"/>
+              </a:spcBef>
+              <a:buFont typeface="Arial" panose="020B0604020202020204" pitchFamily="34" charset="0"/>
+              <a:buNone/>
+              <a:defRPr sz="2000" kern="1200">
+                <a:solidFill>
+                  <a:schemeClr val="tx1">
+                    <a:tint val="75000"/>
+                  </a:schemeClr>
+                </a:solidFill>
+                <a:latin typeface="+mn-lt"/>
+                <a:ea typeface="+mn-ea"/>
+                <a:cs typeface="+mn-cs"/>
+              </a:defRPr>
+            </a:lvl5pPr>
+            <a:lvl6pPr marL="2286000" indent="0" algn="ctr" defTabSz="914400" rtl="0" eaLnBrk="1" latinLnBrk="0" hangingPunct="1">
+              <a:spcBef>
+                <a:spcPct val="20000"/>
+              </a:spcBef>
+              <a:buFont typeface="Arial" panose="020B0604020202020204" pitchFamily="34" charset="0"/>
+              <a:buNone/>
+              <a:defRPr sz="2000" kern="1200">
+                <a:solidFill>
+                  <a:schemeClr val="tx1">
+                    <a:tint val="75000"/>
+                  </a:schemeClr>
+                </a:solidFill>
+                <a:latin typeface="+mn-lt"/>
+                <a:ea typeface="+mn-ea"/>
+                <a:cs typeface="+mn-cs"/>
+              </a:defRPr>
+            </a:lvl6pPr>
+            <a:lvl7pPr marL="2743200" indent="0" algn="ctr" defTabSz="914400" rtl="0" eaLnBrk="1" latinLnBrk="0" hangingPunct="1">
+              <a:spcBef>
+                <a:spcPct val="20000"/>
+              </a:spcBef>
+              <a:buFont typeface="Arial" panose="020B0604020202020204" pitchFamily="34" charset="0"/>
+              <a:buNone/>
+              <a:defRPr sz="2000" kern="1200">
+                <a:solidFill>
+                  <a:schemeClr val="tx1">
+                    <a:tint val="75000"/>
+                  </a:schemeClr>
+                </a:solidFill>
+                <a:latin typeface="+mn-lt"/>
+                <a:ea typeface="+mn-ea"/>
+                <a:cs typeface="+mn-cs"/>
+              </a:defRPr>
+            </a:lvl7pPr>
+            <a:lvl8pPr marL="3200400" indent="0" algn="ctr" defTabSz="914400" rtl="0" eaLnBrk="1" latinLnBrk="0" hangingPunct="1">
+              <a:spcBef>
+                <a:spcPct val="20000"/>
+              </a:spcBef>
+              <a:buFont typeface="Arial" panose="020B0604020202020204" pitchFamily="34" charset="0"/>
+              <a:buNone/>
+              <a:defRPr sz="2000" kern="1200">
+                <a:solidFill>
+                  <a:schemeClr val="tx1">
+                    <a:tint val="75000"/>
+                  </a:schemeClr>
+                </a:solidFill>
+                <a:latin typeface="+mn-lt"/>
+                <a:ea typeface="+mn-ea"/>
+                <a:cs typeface="+mn-cs"/>
+              </a:defRPr>
+            </a:lvl8pPr>
+            <a:lvl9pPr marL="3657600" indent="0" algn="ctr" defTabSz="914400" rtl="0" eaLnBrk="1" latinLnBrk="0" hangingPunct="1">
+              <a:spcBef>
+                <a:spcPct val="20000"/>
+              </a:spcBef>
+              <a:buFont typeface="Arial" panose="020B0604020202020204" pitchFamily="34" charset="0"/>
+              <a:buNone/>
+              <a:defRPr sz="2000" kern="1200">
+                <a:solidFill>
+                  <a:schemeClr val="tx1">
+                    <a:tint val="75000"/>
+                  </a:schemeClr>
+                </a:solidFill>
+                <a:latin typeface="+mn-lt"/>
+                <a:ea typeface="+mn-ea"/>
+                <a:cs typeface="+mn-cs"/>
+              </a:defRPr>
+            </a:lvl9pPr>
+          </a:lstStyle>
+          <a:p>
+            <a:pPr lvl="1" algn="l"/>
+            <a:endParaRPr lang="en-IN" sz="4000" dirty="0">
+              <a:solidFill>
+                <a:srgbClr val="0055A0"/>
+              </a:solidFill>
+            </a:endParaRPr>
+          </a:p>
+          <a:p>
+            <a:pPr lvl="1" algn="l"/>
+            <a:r>
+              <a:rPr lang="en-IN" sz="4000" dirty="0">
+                <a:solidFill>
+                  <a:srgbClr val="0055A0"/>
+                </a:solidFill>
+              </a:rPr>
+              <a:t>Thanks!</a:t>
+            </a:r>
           </a:p>
         </p:txBody>
       </p:sp>
     </p:spTree>
     <p:extLst>
       <p:ext uri="{BB962C8B-B14F-4D97-AF65-F5344CB8AC3E}">
-        <p14:creationId xmlns:p14="http://schemas.microsoft.com/office/powerpoint/2010/main" val="1235205643"/>
+        <p14:creationId xmlns:p14="http://schemas.microsoft.com/office/powerpoint/2010/main" val="3724216054"/>
       </p:ext>
     </p:extLst>
   </p:cSld>

</xml_diff>

<commit_message>
DONE HALF OF DATA PREPROCESSING ,GOING EDA
</commit_message>
<xml_diff>
--- a/Pravin Kumar/Vehicle Loan Default Prediction.pptx
+++ b/Pravin Kumar/Vehicle Loan Default Prediction.pptx
@@ -3742,7 +3742,7 @@
         </p:nvSpPr>
         <p:spPr>
           <a:xfrm>
-            <a:off x="6096000" y="3950495"/>
+            <a:off x="6248943" y="3947984"/>
             <a:ext cx="2088574" cy="523220"/>
           </a:xfrm>
           <a:prstGeom prst="rect">
@@ -3778,8 +3778,8 @@
         </p:nvSpPr>
         <p:spPr>
           <a:xfrm>
-            <a:off x="6218830" y="4451686"/>
-            <a:ext cx="2696570" cy="1938992"/>
+            <a:off x="6276195" y="4451686"/>
+            <a:ext cx="2696570" cy="1631216"/>
           </a:xfrm>
           <a:prstGeom prst="rect">
             <a:avLst/>
@@ -3838,29 +3838,6 @@
               </a:rPr>
               <a:t>Pravin Kumar S</a:t>
             </a:r>
-          </a:p>
-          <a:p>
-            <a:r>
-              <a:rPr lang="en-US" sz="2000" dirty="0">
-                <a:solidFill>
-                  <a:srgbClr val="FF0000"/>
-                </a:solidFill>
-              </a:rPr>
-              <a:t>SR </a:t>
-            </a:r>
-            <a:r>
-              <a:rPr lang="en-US" sz="2000" dirty="0" err="1">
-                <a:solidFill>
-                  <a:srgbClr val="FF0000"/>
-                </a:solidFill>
-              </a:rPr>
-              <a:t>Abilash</a:t>
-            </a:r>
-            <a:endParaRPr lang="en-US" sz="2000" dirty="0">
-              <a:solidFill>
-                <a:srgbClr val="FF0000"/>
-              </a:solidFill>
-            </a:endParaRPr>
           </a:p>
           <a:p>
             <a:r>
@@ -3888,7 +3865,7 @@
         </p:nvSpPr>
         <p:spPr>
           <a:xfrm>
-            <a:off x="917542" y="3945749"/>
+            <a:off x="609600" y="3947984"/>
             <a:ext cx="2362200" cy="523220"/>
           </a:xfrm>
           <a:prstGeom prst="rect">
@@ -3923,7 +3900,7 @@
         </p:nvSpPr>
         <p:spPr>
           <a:xfrm>
-            <a:off x="673355" y="4471203"/>
+            <a:off x="429168" y="4451686"/>
             <a:ext cx="1981200" cy="400110"/>
           </a:xfrm>
           <a:prstGeom prst="rect">

</xml_diff>